<commit_message>
Update business plan && PPT
</commit_message>
<xml_diff>
--- a/PPT/Night Soft.pptx
+++ b/PPT/Night Soft.pptx
@@ -5,24 +5,21 @@
     <p:sldMasterId id="2147483663" r:id="rId2"/>
   </p:sldMasterIdLst>
   <p:notesMasterIdLst>
-    <p:notesMasterId r:id="rId15"/>
+    <p:notesMasterId r:id="rId12"/>
   </p:notesMasterIdLst>
   <p:handoutMasterIdLst>
-    <p:handoutMasterId r:id="rId16"/>
+    <p:handoutMasterId r:id="rId13"/>
   </p:handoutMasterIdLst>
   <p:sldIdLst>
     <p:sldId id="256" r:id="rId3"/>
     <p:sldId id="257" r:id="rId4"/>
     <p:sldId id="258" r:id="rId5"/>
     <p:sldId id="259" r:id="rId6"/>
-    <p:sldId id="260" r:id="rId7"/>
-    <p:sldId id="261" r:id="rId8"/>
-    <p:sldId id="262" r:id="rId9"/>
-    <p:sldId id="263" r:id="rId10"/>
-    <p:sldId id="264" r:id="rId11"/>
-    <p:sldId id="265" r:id="rId12"/>
-    <p:sldId id="266" r:id="rId13"/>
-    <p:sldId id="267" r:id="rId14"/>
+    <p:sldId id="263" r:id="rId7"/>
+    <p:sldId id="264" r:id="rId8"/>
+    <p:sldId id="266" r:id="rId9"/>
+    <p:sldId id="267" r:id="rId10"/>
+    <p:sldId id="268" r:id="rId11"/>
   </p:sldIdLst>
   <p:sldSz cx="9144000" cy="6858000" type="screen4x3"/>
   <p:notesSz cx="6997700" cy="9283700"/>
@@ -153,7 +150,7 @@
   </p:defaultTextStyle>
   <p:extLst>
     <p:ext uri="{EFAFB233-063F-42B5-8137-9DF3F51BA10A}">
-      <p15:sldGuideLst xmlns:p15="http://schemas.microsoft.com/office/powerpoint/2012/main">
+      <p15:sldGuideLst xmlns:p15="http://schemas.microsoft.com/office/powerpoint/2012/main" xmlns="">
         <p15:guide id="1" orient="horz" pos="2160">
           <p15:clr>
             <a:srgbClr val="A4A3A4"/>
@@ -167,7 +164,7 @@
       </p15:sldGuideLst>
     </p:ext>
     <p:ext uri="{2D200454-40CA-4A62-9FC3-DE9A4176ACB9}">
-      <p15:notesGuideLst xmlns:p15="http://schemas.microsoft.com/office/powerpoint/2012/main">
+      <p15:notesGuideLst xmlns:p15="http://schemas.microsoft.com/office/powerpoint/2012/main" xmlns="">
         <p15:guide id="1" orient="horz" pos="2924">
           <p15:clr>
             <a:srgbClr val="A4A3A4"/>
@@ -1125,7 +1122,7 @@
             <a:fld id="{F551B7C3-9D5A-446D-86B2-93E7BEE4E4AD}" type="slidenum">
               <a:rPr lang="en-US"/>
               <a:pPr/>
-              <a:t>12</a:t>
+              <a:t>8</a:t>
             </a:fld>
             <a:endParaRPr lang="en-US"/>
           </a:p>
@@ -1235,7 +1232,6 @@
               <a:rPr lang="en-US" noProof="0" smtClean="0"/>
               <a:t>Click to edit Master title style</a:t>
             </a:r>
-            <a:endParaRPr lang="en-US" noProof="0" smtClean="0"/>
           </a:p>
         </p:txBody>
       </p:sp>
@@ -1274,7 +1270,6 @@
               <a:rPr lang="en-US" noProof="0" smtClean="0"/>
               <a:t>Click to edit Master subtitle style</a:t>
             </a:r>
-            <a:endParaRPr lang="en-US" noProof="0" smtClean="0"/>
           </a:p>
         </p:txBody>
       </p:sp>
@@ -3737,7 +3732,6 @@
               <a:rPr lang="en-US" smtClean="0"/>
               <a:t>Click to edit Master title style</a:t>
             </a:r>
-            <a:endParaRPr lang="en-US" smtClean="0"/>
           </a:p>
         </p:txBody>
       </p:sp>
@@ -3834,7 +3828,6 @@
               <a:rPr lang="en-US" smtClean="0"/>
               <a:t>Fifth level</a:t>
             </a:r>
-            <a:endParaRPr lang="en-US" smtClean="0"/>
           </a:p>
         </p:txBody>
       </p:sp>
@@ -4482,61 +4475,16 @@
           <a:chExt cx="0" cy="0"/>
         </a:xfrm>
       </p:grpSpPr>
-      <p:sp>
-        <p:nvSpPr>
-          <p:cNvPr id="16386" name="Rectangle 2"/>
-          <p:cNvSpPr>
-            <a:spLocks noGrp="1" noChangeArrowheads="1"/>
-          </p:cNvSpPr>
-          <p:nvPr>
-            <p:ph type="ctrTitle"/>
-          </p:nvPr>
-        </p:nvSpPr>
-        <p:spPr/>
-        <p:txBody>
-          <a:bodyPr/>
-          <a:lstStyle/>
-          <a:p>
-            <a:r>
-              <a:rPr lang="en-US" smtClean="0"/>
-              <a:t>Night Soft</a:t>
-            </a:r>
-            <a:endParaRPr lang="en-US" dirty="0"/>
-          </a:p>
-        </p:txBody>
-      </p:sp>
-      <p:sp>
-        <p:nvSpPr>
-          <p:cNvPr id="16387" name="Rectangle 3"/>
-          <p:cNvSpPr>
-            <a:spLocks noGrp="1" noChangeArrowheads="1"/>
-          </p:cNvSpPr>
-          <p:nvPr>
-            <p:ph type="subTitle" idx="1"/>
-          </p:nvPr>
-        </p:nvSpPr>
-        <p:spPr/>
-        <p:txBody>
-          <a:bodyPr/>
-          <a:lstStyle/>
-          <a:p>
-            <a:r>
-              <a:rPr lang="en-US"/>
-              <a:t>Business Plan</a:t>
-            </a:r>
-          </a:p>
-        </p:txBody>
-      </p:sp>
       <p:pic>
         <p:nvPicPr>
-          <p:cNvPr id="16390" name="Picture 6" descr="Logo placeholder"/>
+          <p:cNvPr id="1027" name="Picture 3" descr="C:\Users\e8k\Documents\GitHub\NightLife\Art\nightsoft 1@2x.png"/>
           <p:cNvPicPr>
             <a:picLocks noChangeAspect="1" noChangeArrowheads="1"/>
           </p:cNvPicPr>
           <p:nvPr/>
         </p:nvPicPr>
         <p:blipFill>
-          <a:blip r:embed="rId2">
+          <a:blip r:embed="rId3">
             <a:extLst>
               <a:ext uri="{28A0092B-C50C-407E-A947-70E740481C1C}">
                 <a14:useLocalDpi xmlns:a14="http://schemas.microsoft.com/office/drawing/2010/main" val="0"/>
@@ -4550,16 +4498,13 @@
         </p:blipFill>
         <p:spPr bwMode="auto">
           <a:xfrm>
-            <a:off x="7769225" y="5940425"/>
-            <a:ext cx="855663" cy="428625"/>
+            <a:off x="4499992" y="1628800"/>
+            <a:ext cx="3419085" cy="3456384"/>
           </a:xfrm>
           <a:prstGeom prst="rect">
             <a:avLst/>
           </a:prstGeom>
           <a:noFill/>
-          <a:ln>
-            <a:noFill/>
-          </a:ln>
           <a:extLst>
             <a:ext uri="{909E8E84-426E-40DD-AFC4-6F175D3DCCD1}">
               <a14:hiddenFill xmlns:a14="http://schemas.microsoft.com/office/drawing/2010/main">
@@ -4567,16 +4512,6 @@
                   <a:srgbClr val="FFFFFF"/>
                 </a:solidFill>
               </a14:hiddenFill>
-            </a:ext>
-            <a:ext uri="{91240B29-F687-4F45-9708-019B960494DF}">
-              <a14:hiddenLine xmlns:a14="http://schemas.microsoft.com/office/drawing/2010/main" w="9525">
-                <a:solidFill>
-                  <a:srgbClr val="000000"/>
-                </a:solidFill>
-                <a:miter lim="800000"/>
-                <a:headEnd/>
-                <a:tailEnd/>
-              </a14:hiddenLine>
             </a:ext>
           </a:extLst>
         </p:spPr>
@@ -4586,326 +4521,1105 @@
   <p:clrMapOvr>
     <a:masterClrMapping/>
   </p:clrMapOvr>
-</p:sld>
-</file>
-
-<file path=ppt/slides/slide10.xml><?xml version="1.0" encoding="utf-8"?>
-<p:sld xmlns:a="http://schemas.openxmlformats.org/drawingml/2006/main" xmlns:r="http://schemas.openxmlformats.org/officeDocument/2006/relationships" xmlns:p="http://schemas.openxmlformats.org/presentationml/2006/main">
-  <p:cSld>
-    <p:spTree>
-      <p:nvGrpSpPr>
-        <p:cNvPr id="1" name=""/>
-        <p:cNvGrpSpPr/>
-        <p:nvPr/>
-      </p:nvGrpSpPr>
-      <p:grpSpPr>
-        <a:xfrm>
-          <a:off x="0" y="0"/>
-          <a:ext cx="0" cy="0"/>
-          <a:chOff x="0" y="0"/>
-          <a:chExt cx="0" cy="0"/>
-        </a:xfrm>
-      </p:grpSpPr>
-      <p:sp>
-        <p:nvSpPr>
-          <p:cNvPr id="25602" name="Rectangle 2"/>
-          <p:cNvSpPr>
-            <a:spLocks noGrp="1" noChangeArrowheads="1"/>
-          </p:cNvSpPr>
-          <p:nvPr>
-            <p:ph type="title"/>
-          </p:nvPr>
-        </p:nvSpPr>
-        <p:spPr/>
-        <p:txBody>
-          <a:bodyPr/>
-          <a:lstStyle/>
-          <a:p>
-            <a:r>
-              <a:rPr lang="en-US"/>
-              <a:t>Resource Requirements</a:t>
-            </a:r>
-          </a:p>
-        </p:txBody>
-      </p:sp>
-      <p:sp>
-        <p:nvSpPr>
-          <p:cNvPr id="25603" name="Rectangle 3"/>
-          <p:cNvSpPr>
-            <a:spLocks noGrp="1" noChangeArrowheads="1"/>
-          </p:cNvSpPr>
-          <p:nvPr>
-            <p:ph type="body" idx="1"/>
-          </p:nvPr>
-        </p:nvSpPr>
-        <p:spPr/>
-        <p:txBody>
-          <a:bodyPr/>
-          <a:lstStyle/>
-          <a:p>
-            <a:r>
-              <a:rPr lang="en-US"/>
-              <a:t>List requirements for the following resources:</a:t>
-            </a:r>
-          </a:p>
-          <a:p>
-            <a:pPr lvl="1"/>
-            <a:r>
-              <a:rPr lang="en-US"/>
-              <a:t>Personnel</a:t>
-            </a:r>
-          </a:p>
-          <a:p>
-            <a:pPr lvl="1"/>
-            <a:r>
-              <a:rPr lang="en-US"/>
-              <a:t>Technology</a:t>
-            </a:r>
-          </a:p>
-          <a:p>
-            <a:pPr lvl="1"/>
-            <a:r>
-              <a:rPr lang="en-US"/>
-              <a:t>Finances</a:t>
-            </a:r>
-          </a:p>
-          <a:p>
-            <a:pPr lvl="1"/>
-            <a:r>
-              <a:rPr lang="en-US"/>
-              <a:t>Distribution</a:t>
-            </a:r>
-          </a:p>
-          <a:p>
-            <a:pPr lvl="1"/>
-            <a:r>
-              <a:rPr lang="en-US"/>
-              <a:t>Promotion</a:t>
-            </a:r>
-          </a:p>
-          <a:p>
-            <a:pPr lvl="1"/>
-            <a:r>
-              <a:rPr lang="en-US"/>
-              <a:t>Products</a:t>
-            </a:r>
-          </a:p>
-          <a:p>
-            <a:pPr lvl="1"/>
-            <a:r>
-              <a:rPr lang="en-US"/>
-              <a:t>Services</a:t>
-            </a:r>
-          </a:p>
-        </p:txBody>
-      </p:sp>
-    </p:spTree>
-  </p:cSld>
-  <p:clrMapOvr>
-    <a:masterClrMapping/>
-  </p:clrMapOvr>
   <p:timing>
     <p:tnLst>
       <p:par>
-        <p:cTn id="1" dur="indefinite" restart="never" nodeType="tmRoot"/>
-      </p:par>
-    </p:tnLst>
-  </p:timing>
-</p:sld>
-</file>
-
-<file path=ppt/slides/slide11.xml><?xml version="1.0" encoding="utf-8"?>
-<p:sld xmlns:a="http://schemas.openxmlformats.org/drawingml/2006/main" xmlns:r="http://schemas.openxmlformats.org/officeDocument/2006/relationships" xmlns:p="http://schemas.openxmlformats.org/presentationml/2006/main">
-  <p:cSld>
-    <p:spTree>
-      <p:nvGrpSpPr>
-        <p:cNvPr id="1" name=""/>
-        <p:cNvGrpSpPr/>
-        <p:nvPr/>
-      </p:nvGrpSpPr>
-      <p:grpSpPr>
-        <a:xfrm>
-          <a:off x="0" y="0"/>
-          <a:ext cx="0" cy="0"/>
-          <a:chOff x="0" y="0"/>
-          <a:chExt cx="0" cy="0"/>
-        </a:xfrm>
-      </p:grpSpPr>
-      <p:sp>
-        <p:nvSpPr>
-          <p:cNvPr id="26626" name="Rectangle 2"/>
-          <p:cNvSpPr>
-            <a:spLocks noGrp="1" noChangeArrowheads="1"/>
-          </p:cNvSpPr>
-          <p:nvPr>
-            <p:ph type="title"/>
-          </p:nvPr>
-        </p:nvSpPr>
-        <p:spPr/>
-        <p:txBody>
-          <a:bodyPr/>
-          <a:lstStyle/>
-          <a:p>
-            <a:r>
-              <a:rPr lang="en-US"/>
-              <a:t>Risks and Rewards</a:t>
-            </a:r>
-          </a:p>
-        </p:txBody>
-      </p:sp>
-      <p:sp>
-        <p:nvSpPr>
-          <p:cNvPr id="26627" name="Rectangle 3"/>
-          <p:cNvSpPr>
-            <a:spLocks noGrp="1" noChangeArrowheads="1"/>
-          </p:cNvSpPr>
-          <p:nvPr>
-            <p:ph type="body" idx="1"/>
-          </p:nvPr>
-        </p:nvSpPr>
-        <p:spPr/>
-        <p:txBody>
-          <a:bodyPr/>
-          <a:lstStyle/>
-          <a:p>
-            <a:r>
-              <a:rPr lang="en-US"/>
-              <a:t>Summarize the risks of the proposed project and how they will be addressed.</a:t>
-            </a:r>
-          </a:p>
-          <a:p>
-            <a:r>
-              <a:rPr lang="en-US"/>
-              <a:t>Estimate expected rewards, particularly if you are seeking funding.</a:t>
-            </a:r>
-          </a:p>
-        </p:txBody>
-      </p:sp>
-    </p:spTree>
-  </p:cSld>
-  <p:clrMapOvr>
-    <a:masterClrMapping/>
-  </p:clrMapOvr>
-  <p:timing>
-    <p:tnLst>
-      <p:par>
-        <p:cTn id="1" dur="indefinite" restart="never" nodeType="tmRoot"/>
-      </p:par>
-    </p:tnLst>
-  </p:timing>
-</p:sld>
-</file>
-
-<file path=ppt/slides/slide12.xml><?xml version="1.0" encoding="utf-8"?>
-<p:sld xmlns:a="http://schemas.openxmlformats.org/drawingml/2006/main" xmlns:r="http://schemas.openxmlformats.org/officeDocument/2006/relationships" xmlns:p="http://schemas.openxmlformats.org/presentationml/2006/main">
-  <p:cSld>
-    <p:spTree>
-      <p:nvGrpSpPr>
-        <p:cNvPr id="1" name=""/>
-        <p:cNvGrpSpPr/>
-        <p:nvPr/>
-      </p:nvGrpSpPr>
-      <p:grpSpPr>
-        <a:xfrm>
-          <a:off x="0" y="0"/>
-          <a:ext cx="0" cy="0"/>
-          <a:chOff x="0" y="0"/>
-          <a:chExt cx="0" cy="0"/>
-        </a:xfrm>
-      </p:grpSpPr>
-      <p:sp>
-        <p:nvSpPr>
-          <p:cNvPr id="27650" name="Rectangle 2"/>
-          <p:cNvSpPr>
-            <a:spLocks noGrp="1" noChangeArrowheads="1"/>
-          </p:cNvSpPr>
-          <p:nvPr>
-            <p:ph type="title"/>
-          </p:nvPr>
-        </p:nvSpPr>
-        <p:spPr/>
-        <p:txBody>
-          <a:bodyPr/>
-          <a:lstStyle/>
-          <a:p>
-            <a:r>
-              <a:rPr lang="en-US"/>
-              <a:t>Key Issues</a:t>
-            </a:r>
-          </a:p>
-        </p:txBody>
-      </p:sp>
-      <p:sp>
-        <p:nvSpPr>
-          <p:cNvPr id="27651" name="Rectangle 3"/>
-          <p:cNvSpPr>
-            <a:spLocks noGrp="1" noChangeArrowheads="1"/>
-          </p:cNvSpPr>
-          <p:nvPr>
-            <p:ph type="body" idx="1"/>
-          </p:nvPr>
-        </p:nvSpPr>
-        <p:spPr/>
-        <p:txBody>
-          <a:bodyPr/>
-          <a:lstStyle/>
-          <a:p>
-            <a:r>
-              <a:rPr lang="en-US"/>
-              <a:t>Near term</a:t>
-            </a:r>
-          </a:p>
-          <a:p>
-            <a:pPr lvl="1"/>
-            <a:r>
-              <a:rPr lang="en-US"/>
-              <a:t>Identify key decisions and issues that need immediate or near-term resolution.</a:t>
-            </a:r>
-          </a:p>
-          <a:p>
-            <a:pPr lvl="1"/>
-            <a:r>
-              <a:rPr lang="en-US"/>
-              <a:t>State consequences of decision postponement.</a:t>
-            </a:r>
-          </a:p>
-          <a:p>
-            <a:r>
-              <a:rPr lang="en-US"/>
-              <a:t>Long term</a:t>
-            </a:r>
-          </a:p>
-          <a:p>
-            <a:pPr lvl="1"/>
-            <a:r>
-              <a:rPr lang="en-US"/>
-              <a:t>Identify issues needing long-term resolution.</a:t>
-            </a:r>
-          </a:p>
-          <a:p>
-            <a:pPr lvl="1"/>
-            <a:r>
-              <a:rPr lang="en-US"/>
-              <a:t>State consequences of decision postponement.</a:t>
-            </a:r>
-          </a:p>
-          <a:p>
-            <a:r>
-              <a:rPr lang="en-US"/>
-              <a:t>If you are seeking funding, be specific about any issues that require financial resources for resolution.</a:t>
-            </a:r>
-          </a:p>
-        </p:txBody>
-      </p:sp>
-    </p:spTree>
-  </p:cSld>
-  <p:clrMapOvr>
-    <a:masterClrMapping/>
-  </p:clrMapOvr>
-  <p:timing>
-    <p:tnLst>
-      <p:par>
-        <p:cTn id="1" dur="indefinite" restart="never" nodeType="tmRoot"/>
+        <p:cTn id="1" dur="indefinite" restart="never" nodeType="tmRoot">
+          <p:childTnLst>
+            <p:seq concurrent="1" nextAc="seek">
+              <p:cTn id="2" dur="indefinite" nodeType="mainSeq">
+                <p:childTnLst>
+                  <p:par>
+                    <p:cTn id="3" fill="hold">
+                      <p:stCondLst>
+                        <p:cond delay="indefinite"/>
+                        <p:cond evt="onBegin" delay="0">
+                          <p:tn val="2"/>
+                        </p:cond>
+                      </p:stCondLst>
+                      <p:childTnLst>
+                        <p:par>
+                          <p:cTn id="4" fill="hold">
+                            <p:stCondLst>
+                              <p:cond delay="0"/>
+                            </p:stCondLst>
+                            <p:childTnLst>
+                              <p:par>
+                                <p:cTn id="5" presetID="26" presetClass="entr" presetSubtype="0" fill="hold" nodeType="afterEffect">
+                                  <p:stCondLst>
+                                    <p:cond delay="0"/>
+                                  </p:stCondLst>
+                                  <p:childTnLst>
+                                    <p:set>
+                                      <p:cBhvr>
+                                        <p:cTn id="6" dur="1" fill="hold">
+                                          <p:stCondLst>
+                                            <p:cond delay="0"/>
+                                          </p:stCondLst>
+                                        </p:cTn>
+                                        <p:tgtEl>
+                                          <p:spTgt spid="1027"/>
+                                        </p:tgtEl>
+                                        <p:attrNameLst>
+                                          <p:attrName>style.visibility</p:attrName>
+                                        </p:attrNameLst>
+                                      </p:cBhvr>
+                                      <p:to>
+                                        <p:strVal val="visible"/>
+                                      </p:to>
+                                    </p:set>
+                                    <p:animEffect transition="in" filter="wipe(down)">
+                                      <p:cBhvr>
+                                        <p:cTn id="7" dur="580">
+                                          <p:stCondLst>
+                                            <p:cond delay="0"/>
+                                          </p:stCondLst>
+                                        </p:cTn>
+                                        <p:tgtEl>
+                                          <p:spTgt spid="1027"/>
+                                        </p:tgtEl>
+                                      </p:cBhvr>
+                                    </p:animEffect>
+                                    <p:anim calcmode="lin" valueType="num">
+                                      <p:cBhvr>
+                                        <p:cTn id="8" dur="1822" tmFilter="0,0; 0.14,0.36; 0.43,0.73; 0.71,0.91; 1.0,1.0">
+                                          <p:stCondLst>
+                                            <p:cond delay="0"/>
+                                          </p:stCondLst>
+                                        </p:cTn>
+                                        <p:tgtEl>
+                                          <p:spTgt spid="1027"/>
+                                        </p:tgtEl>
+                                        <p:attrNameLst>
+                                          <p:attrName>ppt_x</p:attrName>
+                                        </p:attrNameLst>
+                                      </p:cBhvr>
+                                      <p:tavLst>
+                                        <p:tav tm="0">
+                                          <p:val>
+                                            <p:strVal val="#ppt_x-0.25"/>
+                                          </p:val>
+                                        </p:tav>
+                                        <p:tav tm="100000">
+                                          <p:val>
+                                            <p:strVal val="#ppt_x"/>
+                                          </p:val>
+                                        </p:tav>
+                                      </p:tavLst>
+                                    </p:anim>
+                                    <p:anim calcmode="lin" valueType="num">
+                                      <p:cBhvr>
+                                        <p:cTn id="9" dur="664" tmFilter="0.0,0.0; 0.25,0.07; 0.50,0.2; 0.75,0.467; 1.0,1.0">
+                                          <p:stCondLst>
+                                            <p:cond delay="0"/>
+                                          </p:stCondLst>
+                                        </p:cTn>
+                                        <p:tgtEl>
+                                          <p:spTgt spid="1027"/>
+                                        </p:tgtEl>
+                                        <p:attrNameLst>
+                                          <p:attrName>ppt_y</p:attrName>
+                                        </p:attrNameLst>
+                                      </p:cBhvr>
+                                      <p:tavLst>
+                                        <p:tav tm="0" fmla="#ppt_y-sin(pi*$)/3">
+                                          <p:val>
+                                            <p:fltVal val="0.5"/>
+                                          </p:val>
+                                        </p:tav>
+                                        <p:tav tm="100000">
+                                          <p:val>
+                                            <p:fltVal val="1"/>
+                                          </p:val>
+                                        </p:tav>
+                                      </p:tavLst>
+                                    </p:anim>
+                                    <p:anim calcmode="lin" valueType="num">
+                                      <p:cBhvr>
+                                        <p:cTn id="10" dur="664" tmFilter="0, 0; 0.125,0.2665; 0.25,0.4; 0.375,0.465; 0.5,0.5;  0.625,0.535; 0.75,0.6; 0.875,0.7335; 1,1">
+                                          <p:stCondLst>
+                                            <p:cond delay="664"/>
+                                          </p:stCondLst>
+                                        </p:cTn>
+                                        <p:tgtEl>
+                                          <p:spTgt spid="1027"/>
+                                        </p:tgtEl>
+                                        <p:attrNameLst>
+                                          <p:attrName>ppt_y</p:attrName>
+                                        </p:attrNameLst>
+                                      </p:cBhvr>
+                                      <p:tavLst>
+                                        <p:tav tm="0" fmla="#ppt_y-sin(pi*$)/9">
+                                          <p:val>
+                                            <p:fltVal val="0"/>
+                                          </p:val>
+                                        </p:tav>
+                                        <p:tav tm="100000">
+                                          <p:val>
+                                            <p:fltVal val="1"/>
+                                          </p:val>
+                                        </p:tav>
+                                      </p:tavLst>
+                                    </p:anim>
+                                    <p:anim calcmode="lin" valueType="num">
+                                      <p:cBhvr>
+                                        <p:cTn id="11" dur="332" tmFilter="0, 0; 0.125,0.2665; 0.25,0.4; 0.375,0.465; 0.5,0.5;  0.625,0.535; 0.75,0.6; 0.875,0.7335; 1,1">
+                                          <p:stCondLst>
+                                            <p:cond delay="1324"/>
+                                          </p:stCondLst>
+                                        </p:cTn>
+                                        <p:tgtEl>
+                                          <p:spTgt spid="1027"/>
+                                        </p:tgtEl>
+                                        <p:attrNameLst>
+                                          <p:attrName>ppt_y</p:attrName>
+                                        </p:attrNameLst>
+                                      </p:cBhvr>
+                                      <p:tavLst>
+                                        <p:tav tm="0" fmla="#ppt_y-sin(pi*$)/27">
+                                          <p:val>
+                                            <p:fltVal val="0"/>
+                                          </p:val>
+                                        </p:tav>
+                                        <p:tav tm="100000">
+                                          <p:val>
+                                            <p:fltVal val="1"/>
+                                          </p:val>
+                                        </p:tav>
+                                      </p:tavLst>
+                                    </p:anim>
+                                    <p:anim calcmode="lin" valueType="num">
+                                      <p:cBhvr>
+                                        <p:cTn id="12" dur="164" tmFilter="0, 0; 0.125,0.2665; 0.25,0.4; 0.375,0.465; 0.5,0.5;  0.625,0.535; 0.75,0.6; 0.875,0.7335; 1,1">
+                                          <p:stCondLst>
+                                            <p:cond delay="1656"/>
+                                          </p:stCondLst>
+                                        </p:cTn>
+                                        <p:tgtEl>
+                                          <p:spTgt spid="1027"/>
+                                        </p:tgtEl>
+                                        <p:attrNameLst>
+                                          <p:attrName>ppt_y</p:attrName>
+                                        </p:attrNameLst>
+                                      </p:cBhvr>
+                                      <p:tavLst>
+                                        <p:tav tm="0" fmla="#ppt_y-sin(pi*$)/81">
+                                          <p:val>
+                                            <p:fltVal val="0"/>
+                                          </p:val>
+                                        </p:tav>
+                                        <p:tav tm="100000">
+                                          <p:val>
+                                            <p:fltVal val="1"/>
+                                          </p:val>
+                                        </p:tav>
+                                      </p:tavLst>
+                                    </p:anim>
+                                    <p:animScale>
+                                      <p:cBhvr>
+                                        <p:cTn id="13" dur="26">
+                                          <p:stCondLst>
+                                            <p:cond delay="650"/>
+                                          </p:stCondLst>
+                                        </p:cTn>
+                                        <p:tgtEl>
+                                          <p:spTgt spid="1027"/>
+                                        </p:tgtEl>
+                                      </p:cBhvr>
+                                      <p:to x="100000" y="60000"/>
+                                    </p:animScale>
+                                    <p:animScale>
+                                      <p:cBhvr>
+                                        <p:cTn id="14" dur="166" decel="50000">
+                                          <p:stCondLst>
+                                            <p:cond delay="676"/>
+                                          </p:stCondLst>
+                                        </p:cTn>
+                                        <p:tgtEl>
+                                          <p:spTgt spid="1027"/>
+                                        </p:tgtEl>
+                                      </p:cBhvr>
+                                      <p:to x="100000" y="100000"/>
+                                    </p:animScale>
+                                    <p:animScale>
+                                      <p:cBhvr>
+                                        <p:cTn id="15" dur="26">
+                                          <p:stCondLst>
+                                            <p:cond delay="1312"/>
+                                          </p:stCondLst>
+                                        </p:cTn>
+                                        <p:tgtEl>
+                                          <p:spTgt spid="1027"/>
+                                        </p:tgtEl>
+                                      </p:cBhvr>
+                                      <p:to x="100000" y="80000"/>
+                                    </p:animScale>
+                                    <p:animScale>
+                                      <p:cBhvr>
+                                        <p:cTn id="16" dur="166" decel="50000">
+                                          <p:stCondLst>
+                                            <p:cond delay="1338"/>
+                                          </p:stCondLst>
+                                        </p:cTn>
+                                        <p:tgtEl>
+                                          <p:spTgt spid="1027"/>
+                                        </p:tgtEl>
+                                      </p:cBhvr>
+                                      <p:to x="100000" y="100000"/>
+                                    </p:animScale>
+                                    <p:animScale>
+                                      <p:cBhvr>
+                                        <p:cTn id="17" dur="26">
+                                          <p:stCondLst>
+                                            <p:cond delay="1642"/>
+                                          </p:stCondLst>
+                                        </p:cTn>
+                                        <p:tgtEl>
+                                          <p:spTgt spid="1027"/>
+                                        </p:tgtEl>
+                                      </p:cBhvr>
+                                      <p:to x="100000" y="90000"/>
+                                    </p:animScale>
+                                    <p:animScale>
+                                      <p:cBhvr>
+                                        <p:cTn id="18" dur="166" decel="50000">
+                                          <p:stCondLst>
+                                            <p:cond delay="1668"/>
+                                          </p:stCondLst>
+                                        </p:cTn>
+                                        <p:tgtEl>
+                                          <p:spTgt spid="1027"/>
+                                        </p:tgtEl>
+                                      </p:cBhvr>
+                                      <p:to x="100000" y="100000"/>
+                                    </p:animScale>
+                                    <p:animScale>
+                                      <p:cBhvr>
+                                        <p:cTn id="19" dur="26">
+                                          <p:stCondLst>
+                                            <p:cond delay="1808"/>
+                                          </p:stCondLst>
+                                        </p:cTn>
+                                        <p:tgtEl>
+                                          <p:spTgt spid="1027"/>
+                                        </p:tgtEl>
+                                      </p:cBhvr>
+                                      <p:to x="100000" y="95000"/>
+                                    </p:animScale>
+                                    <p:animScale>
+                                      <p:cBhvr>
+                                        <p:cTn id="20" dur="166" decel="50000">
+                                          <p:stCondLst>
+                                            <p:cond delay="1834"/>
+                                          </p:stCondLst>
+                                        </p:cTn>
+                                        <p:tgtEl>
+                                          <p:spTgt spid="1027"/>
+                                        </p:tgtEl>
+                                      </p:cBhvr>
+                                      <p:to x="100000" y="100000"/>
+                                    </p:animScale>
+                                  </p:childTnLst>
+                                  <p:subTnLst>
+                                    <p:audio>
+                                      <p:cMediaNode>
+                                        <p:cTn display="0" masterRel="sameClick">
+                                          <p:stCondLst>
+                                            <p:cond evt="begin" delay="0">
+                                              <p:tn val="5"/>
+                                            </p:cond>
+                                          </p:stCondLst>
+                                          <p:endCondLst>
+                                            <p:cond evt="onStopAudio" delay="0">
+                                              <p:tgtEl>
+                                                <p:sldTgt/>
+                                              </p:tgtEl>
+                                            </p:cond>
+                                          </p:endCondLst>
+                                        </p:cTn>
+                                        <p:tgtEl>
+                                          <p:sndTgt r:embed="rId2" name="bomb.wav"/>
+                                        </p:tgtEl>
+                                      </p:cMediaNode>
+                                    </p:audio>
+                                  </p:subTnLst>
+                                </p:cTn>
+                              </p:par>
+                            </p:childTnLst>
+                          </p:cTn>
+                        </p:par>
+                        <p:par>
+                          <p:cTn id="21" fill="hold">
+                            <p:stCondLst>
+                              <p:cond delay="2000"/>
+                            </p:stCondLst>
+                            <p:childTnLst>
+                              <p:par>
+                                <p:cTn id="22" presetID="26" presetClass="emph" presetSubtype="0" fill="hold" nodeType="afterEffect">
+                                  <p:stCondLst>
+                                    <p:cond delay="0"/>
+                                  </p:stCondLst>
+                                  <p:childTnLst>
+                                    <p:animEffect transition="out" filter="fade">
+                                      <p:cBhvr>
+                                        <p:cTn id="23" dur="2000" tmFilter="0, 0; .2, .5; .8, .5; 1, 0"/>
+                                        <p:tgtEl>
+                                          <p:spTgt spid="1027"/>
+                                        </p:tgtEl>
+                                      </p:cBhvr>
+                                    </p:animEffect>
+                                    <p:animScale>
+                                      <p:cBhvr>
+                                        <p:cTn id="24" dur="1000" autoRev="1" fill="hold"/>
+                                        <p:tgtEl>
+                                          <p:spTgt spid="1027"/>
+                                        </p:tgtEl>
+                                      </p:cBhvr>
+                                      <p:by x="105000" y="105000"/>
+                                    </p:animScale>
+                                  </p:childTnLst>
+                                </p:cTn>
+                              </p:par>
+                            </p:childTnLst>
+                          </p:cTn>
+                        </p:par>
+                        <p:par>
+                          <p:cTn id="25" fill="hold">
+                            <p:stCondLst>
+                              <p:cond delay="4000"/>
+                            </p:stCondLst>
+                            <p:childTnLst>
+                              <p:par>
+                                <p:cTn id="26" presetID="26" presetClass="emph" presetSubtype="0" fill="hold" nodeType="afterEffect">
+                                  <p:stCondLst>
+                                    <p:cond delay="0"/>
+                                  </p:stCondLst>
+                                  <p:childTnLst>
+                                    <p:animEffect transition="out" filter="fade">
+                                      <p:cBhvr>
+                                        <p:cTn id="27" dur="2000" tmFilter="0, 0; .2, .5; .8, .5; 1, 0"/>
+                                        <p:tgtEl>
+                                          <p:spTgt spid="1027"/>
+                                        </p:tgtEl>
+                                      </p:cBhvr>
+                                    </p:animEffect>
+                                    <p:animScale>
+                                      <p:cBhvr>
+                                        <p:cTn id="28" dur="1000" autoRev="1" fill="hold"/>
+                                        <p:tgtEl>
+                                          <p:spTgt spid="1027"/>
+                                        </p:tgtEl>
+                                      </p:cBhvr>
+                                      <p:by x="105000" y="105000"/>
+                                    </p:animScale>
+                                  </p:childTnLst>
+                                </p:cTn>
+                              </p:par>
+                            </p:childTnLst>
+                          </p:cTn>
+                        </p:par>
+                        <p:par>
+                          <p:cTn id="29" fill="hold">
+                            <p:stCondLst>
+                              <p:cond delay="6000"/>
+                            </p:stCondLst>
+                            <p:childTnLst>
+                              <p:par>
+                                <p:cTn id="30" presetID="26" presetClass="emph" presetSubtype="0" fill="hold" nodeType="afterEffect">
+                                  <p:stCondLst>
+                                    <p:cond delay="0"/>
+                                  </p:stCondLst>
+                                  <p:childTnLst>
+                                    <p:animEffect transition="out" filter="fade">
+                                      <p:cBhvr>
+                                        <p:cTn id="31" dur="2000" tmFilter="0, 0; .2, .5; .8, .5; 1, 0"/>
+                                        <p:tgtEl>
+                                          <p:spTgt spid="1027"/>
+                                        </p:tgtEl>
+                                      </p:cBhvr>
+                                    </p:animEffect>
+                                    <p:animScale>
+                                      <p:cBhvr>
+                                        <p:cTn id="32" dur="1000" autoRev="1" fill="hold"/>
+                                        <p:tgtEl>
+                                          <p:spTgt spid="1027"/>
+                                        </p:tgtEl>
+                                      </p:cBhvr>
+                                      <p:by x="105000" y="105000"/>
+                                    </p:animScale>
+                                  </p:childTnLst>
+                                </p:cTn>
+                              </p:par>
+                            </p:childTnLst>
+                          </p:cTn>
+                        </p:par>
+                        <p:par>
+                          <p:cTn id="33" fill="hold">
+                            <p:stCondLst>
+                              <p:cond delay="8000"/>
+                            </p:stCondLst>
+                            <p:childTnLst>
+                              <p:par>
+                                <p:cTn id="34" presetID="26" presetClass="emph" presetSubtype="0" fill="hold" nodeType="afterEffect">
+                                  <p:stCondLst>
+                                    <p:cond delay="0"/>
+                                  </p:stCondLst>
+                                  <p:childTnLst>
+                                    <p:animEffect transition="out" filter="fade">
+                                      <p:cBhvr>
+                                        <p:cTn id="35" dur="2000" tmFilter="0, 0; .2, .5; .8, .5; 1, 0"/>
+                                        <p:tgtEl>
+                                          <p:spTgt spid="1027"/>
+                                        </p:tgtEl>
+                                      </p:cBhvr>
+                                    </p:animEffect>
+                                    <p:animScale>
+                                      <p:cBhvr>
+                                        <p:cTn id="36" dur="1000" autoRev="1" fill="hold"/>
+                                        <p:tgtEl>
+                                          <p:spTgt spid="1027"/>
+                                        </p:tgtEl>
+                                      </p:cBhvr>
+                                      <p:by x="105000" y="105000"/>
+                                    </p:animScale>
+                                  </p:childTnLst>
+                                </p:cTn>
+                              </p:par>
+                            </p:childTnLst>
+                          </p:cTn>
+                        </p:par>
+                        <p:par>
+                          <p:cTn id="37" fill="hold">
+                            <p:stCondLst>
+                              <p:cond delay="10000"/>
+                            </p:stCondLst>
+                            <p:childTnLst>
+                              <p:par>
+                                <p:cTn id="38" presetID="26" presetClass="emph" presetSubtype="0" fill="hold" nodeType="afterEffect">
+                                  <p:stCondLst>
+                                    <p:cond delay="0"/>
+                                  </p:stCondLst>
+                                  <p:childTnLst>
+                                    <p:animEffect transition="out" filter="fade">
+                                      <p:cBhvr>
+                                        <p:cTn id="39" dur="2000" tmFilter="0, 0; .2, .5; .8, .5; 1, 0"/>
+                                        <p:tgtEl>
+                                          <p:spTgt spid="1027"/>
+                                        </p:tgtEl>
+                                      </p:cBhvr>
+                                    </p:animEffect>
+                                    <p:animScale>
+                                      <p:cBhvr>
+                                        <p:cTn id="40" dur="1000" autoRev="1" fill="hold"/>
+                                        <p:tgtEl>
+                                          <p:spTgt spid="1027"/>
+                                        </p:tgtEl>
+                                      </p:cBhvr>
+                                      <p:by x="105000" y="105000"/>
+                                    </p:animScale>
+                                  </p:childTnLst>
+                                </p:cTn>
+                              </p:par>
+                            </p:childTnLst>
+                          </p:cTn>
+                        </p:par>
+                        <p:par>
+                          <p:cTn id="41" fill="hold">
+                            <p:stCondLst>
+                              <p:cond delay="12000"/>
+                            </p:stCondLst>
+                            <p:childTnLst>
+                              <p:par>
+                                <p:cTn id="42" presetID="26" presetClass="emph" presetSubtype="0" fill="hold" nodeType="afterEffect">
+                                  <p:stCondLst>
+                                    <p:cond delay="0"/>
+                                  </p:stCondLst>
+                                  <p:childTnLst>
+                                    <p:animEffect transition="out" filter="fade">
+                                      <p:cBhvr>
+                                        <p:cTn id="43" dur="2000" tmFilter="0, 0; .2, .5; .8, .5; 1, 0"/>
+                                        <p:tgtEl>
+                                          <p:spTgt spid="1027"/>
+                                        </p:tgtEl>
+                                      </p:cBhvr>
+                                    </p:animEffect>
+                                    <p:animScale>
+                                      <p:cBhvr>
+                                        <p:cTn id="44" dur="1000" autoRev="1" fill="hold"/>
+                                        <p:tgtEl>
+                                          <p:spTgt spid="1027"/>
+                                        </p:tgtEl>
+                                      </p:cBhvr>
+                                      <p:by x="105000" y="105000"/>
+                                    </p:animScale>
+                                  </p:childTnLst>
+                                </p:cTn>
+                              </p:par>
+                            </p:childTnLst>
+                          </p:cTn>
+                        </p:par>
+                      </p:childTnLst>
+                    </p:cTn>
+                  </p:par>
+                  <p:par>
+                    <p:cTn id="45" fill="hold">
+                      <p:stCondLst>
+                        <p:cond delay="indefinite"/>
+                      </p:stCondLst>
+                      <p:childTnLst>
+                        <p:par>
+                          <p:cTn id="46" fill="hold">
+                            <p:stCondLst>
+                              <p:cond delay="0"/>
+                            </p:stCondLst>
+                            <p:childTnLst>
+                              <p:par>
+                                <p:cTn id="47" presetID="26" presetClass="exit" presetSubtype="0" fill="hold" nodeType="clickEffect">
+                                  <p:stCondLst>
+                                    <p:cond delay="0"/>
+                                  </p:stCondLst>
+                                  <p:childTnLst>
+                                    <p:animEffect transition="out" filter="wipe(down)">
+                                      <p:cBhvr>
+                                        <p:cTn id="48" dur="180" accel="50000">
+                                          <p:stCondLst>
+                                            <p:cond delay="1820"/>
+                                          </p:stCondLst>
+                                        </p:cTn>
+                                        <p:tgtEl>
+                                          <p:spTgt spid="1027"/>
+                                        </p:tgtEl>
+                                      </p:cBhvr>
+                                    </p:animEffect>
+                                    <p:anim calcmode="lin" valueType="num">
+                                      <p:cBhvr>
+                                        <p:cTn id="49" dur="1822" tmFilter="0,0; 0.14,0.31; 0.43,0.73; 0.71,0.91; 1.0,1.0">
+                                          <p:stCondLst>
+                                            <p:cond delay="0"/>
+                                          </p:stCondLst>
+                                        </p:cTn>
+                                        <p:tgtEl>
+                                          <p:spTgt spid="1027"/>
+                                        </p:tgtEl>
+                                        <p:attrNameLst>
+                                          <p:attrName>ppt_x</p:attrName>
+                                        </p:attrNameLst>
+                                      </p:cBhvr>
+                                      <p:tavLst>
+                                        <p:tav tm="0">
+                                          <p:val>
+                                            <p:strVal val="ppt_x"/>
+                                          </p:val>
+                                        </p:tav>
+                                        <p:tav tm="100000">
+                                          <p:val>
+                                            <p:strVal val="#ppt_x+0.25"/>
+                                          </p:val>
+                                        </p:tav>
+                                      </p:tavLst>
+                                    </p:anim>
+                                    <p:anim calcmode="lin" valueType="num">
+                                      <p:cBhvr>
+                                        <p:cTn id="50" dur="178">
+                                          <p:stCondLst>
+                                            <p:cond delay="1822"/>
+                                          </p:stCondLst>
+                                        </p:cTn>
+                                        <p:tgtEl>
+                                          <p:spTgt spid="1027"/>
+                                        </p:tgtEl>
+                                        <p:attrNameLst>
+                                          <p:attrName>ppt_x</p:attrName>
+                                        </p:attrNameLst>
+                                      </p:cBhvr>
+                                      <p:tavLst>
+                                        <p:tav tm="0">
+                                          <p:val>
+                                            <p:strVal val="ppt_x"/>
+                                          </p:val>
+                                        </p:tav>
+                                        <p:tav tm="100000">
+                                          <p:val>
+                                            <p:strVal val="ppt_x"/>
+                                          </p:val>
+                                        </p:tav>
+                                      </p:tavLst>
+                                    </p:anim>
+                                    <p:anim calcmode="lin" valueType="num">
+                                      <p:cBhvr>
+                                        <p:cTn id="51" dur="664" tmFilter="0.0,0.0;0.25,0.07;0.50,0.2;0.75,0.467;1.0,1.0">
+                                          <p:stCondLst>
+                                            <p:cond delay="0"/>
+                                          </p:stCondLst>
+                                        </p:cTn>
+                                        <p:tgtEl>
+                                          <p:spTgt spid="1027"/>
+                                        </p:tgtEl>
+                                        <p:attrNameLst>
+                                          <p:attrName>ppt_y</p:attrName>
+                                        </p:attrNameLst>
+                                      </p:cBhvr>
+                                      <p:tavLst>
+                                        <p:tav tm="0">
+                                          <p:val>
+                                            <p:strVal val="ppt_y"/>
+                                          </p:val>
+                                        </p:tav>
+                                        <p:tav tm="5000">
+                                          <p:val>
+                                            <p:strVal val="ppt_y+0.026"/>
+                                          </p:val>
+                                        </p:tav>
+                                        <p:tav tm="10000">
+                                          <p:val>
+                                            <p:strVal val="ppt_y+0.052"/>
+                                          </p:val>
+                                        </p:tav>
+                                        <p:tav tm="15000">
+                                          <p:val>
+                                            <p:strVal val="ppt_y+0.078"/>
+                                          </p:val>
+                                        </p:tav>
+                                        <p:tav tm="20000">
+                                          <p:val>
+                                            <p:strVal val="ppt_y+0.103"/>
+                                          </p:val>
+                                        </p:tav>
+                                        <p:tav tm="30000">
+                                          <p:val>
+                                            <p:strVal val="ppt_y+0.151"/>
+                                          </p:val>
+                                        </p:tav>
+                                        <p:tav tm="40000">
+                                          <p:val>
+                                            <p:strVal val="ppt_y+0.196"/>
+                                          </p:val>
+                                        </p:tav>
+                                        <p:tav tm="50000">
+                                          <p:val>
+                                            <p:strVal val="ppt_y+0.236"/>
+                                          </p:val>
+                                        </p:tav>
+                                        <p:tav tm="60000">
+                                          <p:val>
+                                            <p:strVal val="ppt_y+0.270"/>
+                                          </p:val>
+                                        </p:tav>
+                                        <p:tav tm="70000">
+                                          <p:val>
+                                            <p:strVal val="ppt_y+0.297"/>
+                                          </p:val>
+                                        </p:tav>
+                                        <p:tav tm="80000">
+                                          <p:val>
+                                            <p:strVal val="ppt_y+0.317"/>
+                                          </p:val>
+                                        </p:tav>
+                                        <p:tav tm="90000">
+                                          <p:val>
+                                            <p:strVal val="ppt_y+0.329"/>
+                                          </p:val>
+                                        </p:tav>
+                                        <p:tav tm="100000">
+                                          <p:val>
+                                            <p:strVal val="ppt_y+0.333"/>
+                                          </p:val>
+                                        </p:tav>
+                                      </p:tavLst>
+                                    </p:anim>
+                                    <p:anim calcmode="lin" valueType="num">
+                                      <p:cBhvr>
+                                        <p:cTn id="52" dur="664" tmFilter="0, 0; 0.125,0.2665; 0.25,0.4; 0.375,0.465; 0.5,0.5;  0.625,0.535; 0.75,0.6; 0.875,0.7335; 1,1">
+                                          <p:stCondLst>
+                                            <p:cond delay="664"/>
+                                          </p:stCondLst>
+                                        </p:cTn>
+                                        <p:tgtEl>
+                                          <p:spTgt spid="1027"/>
+                                        </p:tgtEl>
+                                        <p:attrNameLst>
+                                          <p:attrName>ppt_y</p:attrName>
+                                        </p:attrNameLst>
+                                      </p:cBhvr>
+                                      <p:tavLst>
+                                        <p:tav tm="0">
+                                          <p:val>
+                                            <p:strVal val="ppt_y"/>
+                                          </p:val>
+                                        </p:tav>
+                                        <p:tav tm="10000">
+                                          <p:val>
+                                            <p:strVal val="ppt_y-0.034"/>
+                                          </p:val>
+                                        </p:tav>
+                                        <p:tav tm="20000">
+                                          <p:val>
+                                            <p:strVal val="ppt_y-0.065"/>
+                                          </p:val>
+                                        </p:tav>
+                                        <p:tav tm="30000">
+                                          <p:val>
+                                            <p:strVal val="ppt_y-0.090"/>
+                                          </p:val>
+                                        </p:tav>
+                                        <p:tav tm="40000">
+                                          <p:val>
+                                            <p:strVal val="ppt_y-0.106"/>
+                                          </p:val>
+                                        </p:tav>
+                                        <p:tav tm="50000">
+                                          <p:val>
+                                            <p:strVal val="ppt_y-0.111"/>
+                                          </p:val>
+                                        </p:tav>
+                                        <p:tav tm="60000">
+                                          <p:val>
+                                            <p:strVal val="ppt_y-0.106"/>
+                                          </p:val>
+                                        </p:tav>
+                                        <p:tav tm="70000">
+                                          <p:val>
+                                            <p:strVal val="ppt_y-0.090"/>
+                                          </p:val>
+                                        </p:tav>
+                                        <p:tav tm="80000">
+                                          <p:val>
+                                            <p:strVal val="ppt_y-0.065"/>
+                                          </p:val>
+                                        </p:tav>
+                                        <p:tav tm="90000">
+                                          <p:val>
+                                            <p:strVal val="ppt_y-0.034"/>
+                                          </p:val>
+                                        </p:tav>
+                                        <p:tav tm="100000">
+                                          <p:val>
+                                            <p:strVal val="ppt_y"/>
+                                          </p:val>
+                                        </p:tav>
+                                      </p:tavLst>
+                                    </p:anim>
+                                    <p:anim calcmode="lin" valueType="num">
+                                      <p:cBhvr>
+                                        <p:cTn id="53" dur="332" tmFilter="0, 0; 0.125,0.2665; 0.25,0.4; 0.375,0.465; 0.5,0.5;  0.625,0.535; 0.75,0.6; 0.875,0.7335; 1,1">
+                                          <p:stCondLst>
+                                            <p:cond delay="1324"/>
+                                          </p:stCondLst>
+                                        </p:cTn>
+                                        <p:tgtEl>
+                                          <p:spTgt spid="1027"/>
+                                        </p:tgtEl>
+                                        <p:attrNameLst>
+                                          <p:attrName>ppt_y</p:attrName>
+                                        </p:attrNameLst>
+                                      </p:cBhvr>
+                                      <p:tavLst>
+                                        <p:tav tm="0">
+                                          <p:val>
+                                            <p:strVal val="ppt_y"/>
+                                          </p:val>
+                                        </p:tav>
+                                        <p:tav tm="10000">
+                                          <p:val>
+                                            <p:strVal val="ppt_y-0.011"/>
+                                          </p:val>
+                                        </p:tav>
+                                        <p:tav tm="20000">
+                                          <p:val>
+                                            <p:strVal val="ppt_y-0.022"/>
+                                          </p:val>
+                                        </p:tav>
+                                        <p:tav tm="30000">
+                                          <p:val>
+                                            <p:strVal val="ppt_y-0.030"/>
+                                          </p:val>
+                                        </p:tav>
+                                        <p:tav tm="40000">
+                                          <p:val>
+                                            <p:strVal val="ppt_y-0.035"/>
+                                          </p:val>
+                                        </p:tav>
+                                        <p:tav tm="50000">
+                                          <p:val>
+                                            <p:strVal val="ppt_y-0.037"/>
+                                          </p:val>
+                                        </p:tav>
+                                        <p:tav tm="60000">
+                                          <p:val>
+                                            <p:strVal val="ppt_y-0.035"/>
+                                          </p:val>
+                                        </p:tav>
+                                        <p:tav tm="70000">
+                                          <p:val>
+                                            <p:strVal val="ppt_y-0.030"/>
+                                          </p:val>
+                                        </p:tav>
+                                        <p:tav tm="80000">
+                                          <p:val>
+                                            <p:strVal val="ppt_y-0.022"/>
+                                          </p:val>
+                                        </p:tav>
+                                        <p:tav tm="90000">
+                                          <p:val>
+                                            <p:strVal val="ppt_y-0.011"/>
+                                          </p:val>
+                                        </p:tav>
+                                        <p:tav tm="100000">
+                                          <p:val>
+                                            <p:strVal val="ppt_y"/>
+                                          </p:val>
+                                        </p:tav>
+                                      </p:tavLst>
+                                    </p:anim>
+                                    <p:anim calcmode="lin" valueType="num">
+                                      <p:cBhvr>
+                                        <p:cTn id="54" dur="164" tmFilter="0, 0; 0.125,0.2665; 0.25,0.4; 0.375,0.465; 0.5,0.5;  0.625,0.535; 0.75,0.6; 0.875,0.7335; 1,1">
+                                          <p:stCondLst>
+                                            <p:cond delay="1656"/>
+                                          </p:stCondLst>
+                                        </p:cTn>
+                                        <p:tgtEl>
+                                          <p:spTgt spid="1027"/>
+                                        </p:tgtEl>
+                                        <p:attrNameLst>
+                                          <p:attrName>ppt_y</p:attrName>
+                                        </p:attrNameLst>
+                                      </p:cBhvr>
+                                      <p:tavLst>
+                                        <p:tav tm="0">
+                                          <p:val>
+                                            <p:strVal val="ppt_y"/>
+                                          </p:val>
+                                        </p:tav>
+                                        <p:tav tm="10000">
+                                          <p:val>
+                                            <p:strVal val="ppt_y-0.004"/>
+                                          </p:val>
+                                        </p:tav>
+                                        <p:tav tm="20000">
+                                          <p:val>
+                                            <p:strVal val="ppt_y-0.007"/>
+                                          </p:val>
+                                        </p:tav>
+                                        <p:tav tm="30000">
+                                          <p:val>
+                                            <p:strVal val="ppt_y-0.010"/>
+                                          </p:val>
+                                        </p:tav>
+                                        <p:tav tm="40000">
+                                          <p:val>
+                                            <p:strVal val="ppt_y-0.012"/>
+                                          </p:val>
+                                        </p:tav>
+                                        <p:tav tm="50000">
+                                          <p:val>
+                                            <p:strVal val="ppt_y-0.0123"/>
+                                          </p:val>
+                                        </p:tav>
+                                        <p:tav tm="60000">
+                                          <p:val>
+                                            <p:strVal val="ppt_y-0.012"/>
+                                          </p:val>
+                                        </p:tav>
+                                        <p:tav tm="70000">
+                                          <p:val>
+                                            <p:strVal val="ppt_y-0.010"/>
+                                          </p:val>
+                                        </p:tav>
+                                        <p:tav tm="80000">
+                                          <p:val>
+                                            <p:strVal val="ppt_y-0.007"/>
+                                          </p:val>
+                                        </p:tav>
+                                        <p:tav tm="90000">
+                                          <p:val>
+                                            <p:strVal val="ppt_y-0.004"/>
+                                          </p:val>
+                                        </p:tav>
+                                        <p:tav tm="100000">
+                                          <p:val>
+                                            <p:strVal val="ppt_y"/>
+                                          </p:val>
+                                        </p:tav>
+                                      </p:tavLst>
+                                    </p:anim>
+                                    <p:anim calcmode="lin" valueType="num">
+                                      <p:cBhvr>
+                                        <p:cTn id="55" dur="180" accel="50000">
+                                          <p:stCondLst>
+                                            <p:cond delay="1820"/>
+                                          </p:stCondLst>
+                                        </p:cTn>
+                                        <p:tgtEl>
+                                          <p:spTgt spid="1027"/>
+                                        </p:tgtEl>
+                                        <p:attrNameLst>
+                                          <p:attrName>ppt_y</p:attrName>
+                                        </p:attrNameLst>
+                                      </p:cBhvr>
+                                      <p:tavLst>
+                                        <p:tav tm="0">
+                                          <p:val>
+                                            <p:strVal val="ppt_y"/>
+                                          </p:val>
+                                        </p:tav>
+                                        <p:tav tm="100000">
+                                          <p:val>
+                                            <p:strVal val="ppt_y+ppt_h"/>
+                                          </p:val>
+                                        </p:tav>
+                                      </p:tavLst>
+                                    </p:anim>
+                                    <p:animScale>
+                                      <p:cBhvr>
+                                        <p:cTn id="56" dur="26">
+                                          <p:stCondLst>
+                                            <p:cond delay="620"/>
+                                          </p:stCondLst>
+                                        </p:cTn>
+                                        <p:tgtEl>
+                                          <p:spTgt spid="1027"/>
+                                        </p:tgtEl>
+                                      </p:cBhvr>
+                                      <p:to x="100000" y="60000"/>
+                                    </p:animScale>
+                                    <p:animScale>
+                                      <p:cBhvr>
+                                        <p:cTn id="57" dur="166" decel="50000">
+                                          <p:stCondLst>
+                                            <p:cond delay="646"/>
+                                          </p:stCondLst>
+                                        </p:cTn>
+                                        <p:tgtEl>
+                                          <p:spTgt spid="1027"/>
+                                        </p:tgtEl>
+                                      </p:cBhvr>
+                                      <p:to x="100000" y="100000"/>
+                                    </p:animScale>
+                                    <p:animScale>
+                                      <p:cBhvr>
+                                        <p:cTn id="58" dur="26">
+                                          <p:stCondLst>
+                                            <p:cond delay="1312"/>
+                                          </p:stCondLst>
+                                        </p:cTn>
+                                        <p:tgtEl>
+                                          <p:spTgt spid="1027"/>
+                                        </p:tgtEl>
+                                      </p:cBhvr>
+                                      <p:to x="100000" y="80000"/>
+                                    </p:animScale>
+                                    <p:animScale>
+                                      <p:cBhvr>
+                                        <p:cTn id="59" dur="166" decel="50000">
+                                          <p:stCondLst>
+                                            <p:cond delay="1338"/>
+                                          </p:stCondLst>
+                                        </p:cTn>
+                                        <p:tgtEl>
+                                          <p:spTgt spid="1027"/>
+                                        </p:tgtEl>
+                                      </p:cBhvr>
+                                      <p:to x="100000" y="100000"/>
+                                    </p:animScale>
+                                    <p:animScale>
+                                      <p:cBhvr>
+                                        <p:cTn id="60" dur="26">
+                                          <p:stCondLst>
+                                            <p:cond delay="1642"/>
+                                          </p:stCondLst>
+                                        </p:cTn>
+                                        <p:tgtEl>
+                                          <p:spTgt spid="1027"/>
+                                        </p:tgtEl>
+                                      </p:cBhvr>
+                                      <p:to x="100000" y="90000"/>
+                                    </p:animScale>
+                                    <p:animScale>
+                                      <p:cBhvr>
+                                        <p:cTn id="61" dur="166" decel="50000">
+                                          <p:stCondLst>
+                                            <p:cond delay="1668"/>
+                                          </p:stCondLst>
+                                        </p:cTn>
+                                        <p:tgtEl>
+                                          <p:spTgt spid="1027"/>
+                                        </p:tgtEl>
+                                      </p:cBhvr>
+                                      <p:to x="100000" y="100000"/>
+                                    </p:animScale>
+                                    <p:animScale>
+                                      <p:cBhvr>
+                                        <p:cTn id="62" dur="26">
+                                          <p:stCondLst>
+                                            <p:cond delay="1808"/>
+                                          </p:stCondLst>
+                                        </p:cTn>
+                                        <p:tgtEl>
+                                          <p:spTgt spid="1027"/>
+                                        </p:tgtEl>
+                                      </p:cBhvr>
+                                      <p:to x="100000" y="95000"/>
+                                    </p:animScale>
+                                    <p:animScale>
+                                      <p:cBhvr>
+                                        <p:cTn id="63" dur="166" decel="50000">
+                                          <p:stCondLst>
+                                            <p:cond delay="1834"/>
+                                          </p:stCondLst>
+                                        </p:cTn>
+                                        <p:tgtEl>
+                                          <p:spTgt spid="1027"/>
+                                        </p:tgtEl>
+                                      </p:cBhvr>
+                                      <p:to x="100000" y="100000"/>
+                                    </p:animScale>
+                                    <p:set>
+                                      <p:cBhvr>
+                                        <p:cTn id="64" dur="1" fill="hold">
+                                          <p:stCondLst>
+                                            <p:cond delay="1999"/>
+                                          </p:stCondLst>
+                                        </p:cTn>
+                                        <p:tgtEl>
+                                          <p:spTgt spid="1027"/>
+                                        </p:tgtEl>
+                                        <p:attrNameLst>
+                                          <p:attrName>style.visibility</p:attrName>
+                                        </p:attrNameLst>
+                                      </p:cBhvr>
+                                      <p:to>
+                                        <p:strVal val="hidden"/>
+                                      </p:to>
+                                    </p:set>
+                                  </p:childTnLst>
+                                </p:cTn>
+                              </p:par>
+                            </p:childTnLst>
+                          </p:cTn>
+                        </p:par>
+                      </p:childTnLst>
+                    </p:cTn>
+                  </p:par>
+                </p:childTnLst>
+              </p:cTn>
+              <p:prevCondLst>
+                <p:cond evt="onPrev" delay="0">
+                  <p:tgtEl>
+                    <p:sldTgt/>
+                  </p:tgtEl>
+                </p:cond>
+              </p:prevCondLst>
+              <p:nextCondLst>
+                <p:cond evt="onNext" delay="0">
+                  <p:tgtEl>
+                    <p:sldTgt/>
+                  </p:tgtEl>
+                </p:cond>
+              </p:nextCondLst>
+            </p:seq>
+          </p:childTnLst>
+        </p:cTn>
       </p:par>
     </p:tnLst>
   </p:timing>
@@ -4945,9 +5659,10 @@
           <a:lstStyle/>
           <a:p>
             <a:r>
-              <a:rPr lang="en-US"/>
-              <a:t>Mission Statement</a:t>
-            </a:r>
+              <a:rPr lang="en-US" dirty="0" smtClean="0"/>
+              <a:t>Concept</a:t>
+            </a:r>
+            <a:endParaRPr lang="en-US" dirty="0"/>
           </a:p>
         </p:txBody>
       </p:sp>
@@ -4961,30 +5676,456 @@
             <p:ph type="body" idx="1"/>
           </p:nvPr>
         </p:nvSpPr>
-        <p:spPr/>
+        <p:spPr>
+          <a:xfrm>
+            <a:off x="1907704" y="2204864"/>
+            <a:ext cx="6934200" cy="2736304"/>
+          </a:xfrm>
+        </p:spPr>
         <p:txBody>
           <a:bodyPr/>
           <a:lstStyle/>
           <a:p>
-            <a:r>
-              <a:rPr lang="en-US"/>
-              <a:t>Clearly state your company’s long-term mission.</a:t>
-            </a:r>
-          </a:p>
-          <a:p>
-            <a:pPr lvl="1"/>
-            <a:r>
-              <a:rPr lang="en-US"/>
-              <a:t>Try to use words that will help direct the growth of your company, but be as concise as possible.</a:t>
+            <a:pPr lvl="0"/>
+            <a:r>
+              <a:rPr lang="fr-FR" dirty="0" smtClean="0"/>
+              <a:t>Commander depuis </a:t>
+            </a:r>
+            <a:r>
+              <a:rPr lang="fr-FR" dirty="0"/>
+              <a:t>une </a:t>
+            </a:r>
+            <a:r>
+              <a:rPr lang="fr-FR" dirty="0" smtClean="0"/>
+              <a:t>tablette.</a:t>
+            </a:r>
+          </a:p>
+          <a:p>
+            <a:pPr lvl="0"/>
+            <a:r>
+              <a:rPr lang="fr-FR" dirty="0" smtClean="0"/>
+              <a:t>Une </a:t>
+            </a:r>
+            <a:r>
+              <a:rPr lang="fr-FR" dirty="0"/>
+              <a:t>tablette « server » afin de voir les commandes qui ont été passé.</a:t>
+            </a:r>
+            <a:endParaRPr lang="en-US" dirty="0"/>
+          </a:p>
+          <a:p>
+            <a:pPr lvl="0"/>
+            <a:r>
+              <a:rPr lang="fr-FR" dirty="0"/>
+              <a:t>Permettre </a:t>
+            </a:r>
+            <a:r>
+              <a:rPr lang="fr-FR" dirty="0" smtClean="0"/>
+              <a:t>à des marques </a:t>
+            </a:r>
+            <a:r>
+              <a:rPr lang="fr-FR" dirty="0"/>
+              <a:t>d'avoir un support visuel sur les tablettes</a:t>
+            </a:r>
+            <a:r>
+              <a:rPr lang="fr-FR" dirty="0" smtClean="0"/>
+              <a:t>.</a:t>
+            </a:r>
+          </a:p>
+          <a:p>
+            <a:pPr lvl="0"/>
+            <a:r>
+              <a:rPr lang="fr-FR" dirty="0" smtClean="0"/>
+              <a:t>Permettre aux gérants d’avoir des statistiques.</a:t>
+            </a:r>
+          </a:p>
+          <a:p>
+            <a:pPr lvl="0"/>
+            <a:r>
+              <a:rPr lang="fr-FR" dirty="0"/>
+              <a:t>N</a:t>
+            </a:r>
+            <a:r>
+              <a:rPr lang="fr-FR" dirty="0" smtClean="0"/>
+              <a:t>umérisation des cartes de restaurants. </a:t>
             </a:r>
           </a:p>
         </p:txBody>
       </p:sp>
+      <p:pic>
+        <p:nvPicPr>
+          <p:cNvPr id="2050" name="Picture 2" descr="C:\Users\e8k\Documents\GitHub\NightLife\Art\nightsoft 1.png"/>
+          <p:cNvPicPr>
+            <a:picLocks noChangeAspect="1" noChangeArrowheads="1"/>
+          </p:cNvPicPr>
+          <p:nvPr/>
+        </p:nvPicPr>
+        <p:blipFill>
+          <a:blip r:embed="rId2">
+            <a:extLst>
+              <a:ext uri="{28A0092B-C50C-407E-A947-70E740481C1C}">
+                <a14:useLocalDpi xmlns:a14="http://schemas.microsoft.com/office/drawing/2010/main" val="0"/>
+              </a:ext>
+            </a:extLst>
+          </a:blip>
+          <a:srcRect/>
+          <a:stretch>
+            <a:fillRect/>
+          </a:stretch>
+        </p:blipFill>
+        <p:spPr bwMode="auto">
+          <a:xfrm>
+            <a:off x="48356" y="44624"/>
+            <a:ext cx="1673768" cy="1692027"/>
+          </a:xfrm>
+          <a:prstGeom prst="rect">
+            <a:avLst/>
+          </a:prstGeom>
+          <a:noFill/>
+          <a:extLst>
+            <a:ext uri="{909E8E84-426E-40DD-AFC4-6F175D3DCCD1}">
+              <a14:hiddenFill xmlns:a14="http://schemas.microsoft.com/office/drawing/2010/main">
+                <a:solidFill>
+                  <a:srgbClr val="FFFFFF"/>
+                </a:solidFill>
+              </a14:hiddenFill>
+            </a:ext>
+          </a:extLst>
+        </p:spPr>
+      </p:pic>
     </p:spTree>
   </p:cSld>
   <p:clrMapOvr>
     <a:masterClrMapping/>
   </p:clrMapOvr>
+  <p:timing>
+    <p:tnLst>
+      <p:par>
+        <p:cTn id="1" dur="indefinite" restart="never" nodeType="tmRoot">
+          <p:childTnLst>
+            <p:seq concurrent="1" nextAc="seek">
+              <p:cTn id="2" dur="indefinite" nodeType="mainSeq">
+                <p:childTnLst>
+                  <p:par>
+                    <p:cTn id="3" fill="hold">
+                      <p:stCondLst>
+                        <p:cond delay="indefinite"/>
+                        <p:cond evt="onBegin" delay="0">
+                          <p:tn val="2"/>
+                        </p:cond>
+                      </p:stCondLst>
+                      <p:childTnLst>
+                        <p:par>
+                          <p:cTn id="4" fill="hold">
+                            <p:stCondLst>
+                              <p:cond delay="0"/>
+                            </p:stCondLst>
+                            <p:childTnLst>
+                              <p:par>
+                                <p:cTn id="5" presetID="26" presetClass="entr" presetSubtype="0" fill="hold" nodeType="afterEffect">
+                                  <p:stCondLst>
+                                    <p:cond delay="0"/>
+                                  </p:stCondLst>
+                                  <p:childTnLst>
+                                    <p:set>
+                                      <p:cBhvr>
+                                        <p:cTn id="6" dur="1" fill="hold">
+                                          <p:stCondLst>
+                                            <p:cond delay="0"/>
+                                          </p:stCondLst>
+                                        </p:cTn>
+                                        <p:tgtEl>
+                                          <p:spTgt spid="2050"/>
+                                        </p:tgtEl>
+                                        <p:attrNameLst>
+                                          <p:attrName>style.visibility</p:attrName>
+                                        </p:attrNameLst>
+                                      </p:cBhvr>
+                                      <p:to>
+                                        <p:strVal val="visible"/>
+                                      </p:to>
+                                    </p:set>
+                                    <p:animEffect transition="in" filter="wipe(down)">
+                                      <p:cBhvr>
+                                        <p:cTn id="7" dur="580">
+                                          <p:stCondLst>
+                                            <p:cond delay="0"/>
+                                          </p:stCondLst>
+                                        </p:cTn>
+                                        <p:tgtEl>
+                                          <p:spTgt spid="2050"/>
+                                        </p:tgtEl>
+                                      </p:cBhvr>
+                                    </p:animEffect>
+                                    <p:anim calcmode="lin" valueType="num">
+                                      <p:cBhvr>
+                                        <p:cTn id="8" dur="1822" tmFilter="0,0; 0.14,0.36; 0.43,0.73; 0.71,0.91; 1.0,1.0">
+                                          <p:stCondLst>
+                                            <p:cond delay="0"/>
+                                          </p:stCondLst>
+                                        </p:cTn>
+                                        <p:tgtEl>
+                                          <p:spTgt spid="2050"/>
+                                        </p:tgtEl>
+                                        <p:attrNameLst>
+                                          <p:attrName>ppt_x</p:attrName>
+                                        </p:attrNameLst>
+                                      </p:cBhvr>
+                                      <p:tavLst>
+                                        <p:tav tm="0">
+                                          <p:val>
+                                            <p:strVal val="#ppt_x-0.25"/>
+                                          </p:val>
+                                        </p:tav>
+                                        <p:tav tm="100000">
+                                          <p:val>
+                                            <p:strVal val="#ppt_x"/>
+                                          </p:val>
+                                        </p:tav>
+                                      </p:tavLst>
+                                    </p:anim>
+                                    <p:anim calcmode="lin" valueType="num">
+                                      <p:cBhvr>
+                                        <p:cTn id="9" dur="664" tmFilter="0.0,0.0; 0.25,0.07; 0.50,0.2; 0.75,0.467; 1.0,1.0">
+                                          <p:stCondLst>
+                                            <p:cond delay="0"/>
+                                          </p:stCondLst>
+                                        </p:cTn>
+                                        <p:tgtEl>
+                                          <p:spTgt spid="2050"/>
+                                        </p:tgtEl>
+                                        <p:attrNameLst>
+                                          <p:attrName>ppt_y</p:attrName>
+                                        </p:attrNameLst>
+                                      </p:cBhvr>
+                                      <p:tavLst>
+                                        <p:tav tm="0" fmla="#ppt_y-sin(pi*$)/3">
+                                          <p:val>
+                                            <p:fltVal val="0.5"/>
+                                          </p:val>
+                                        </p:tav>
+                                        <p:tav tm="100000">
+                                          <p:val>
+                                            <p:fltVal val="1"/>
+                                          </p:val>
+                                        </p:tav>
+                                      </p:tavLst>
+                                    </p:anim>
+                                    <p:anim calcmode="lin" valueType="num">
+                                      <p:cBhvr>
+                                        <p:cTn id="10" dur="664" tmFilter="0, 0; 0.125,0.2665; 0.25,0.4; 0.375,0.465; 0.5,0.5;  0.625,0.535; 0.75,0.6; 0.875,0.7335; 1,1">
+                                          <p:stCondLst>
+                                            <p:cond delay="664"/>
+                                          </p:stCondLst>
+                                        </p:cTn>
+                                        <p:tgtEl>
+                                          <p:spTgt spid="2050"/>
+                                        </p:tgtEl>
+                                        <p:attrNameLst>
+                                          <p:attrName>ppt_y</p:attrName>
+                                        </p:attrNameLst>
+                                      </p:cBhvr>
+                                      <p:tavLst>
+                                        <p:tav tm="0" fmla="#ppt_y-sin(pi*$)/9">
+                                          <p:val>
+                                            <p:fltVal val="0"/>
+                                          </p:val>
+                                        </p:tav>
+                                        <p:tav tm="100000">
+                                          <p:val>
+                                            <p:fltVal val="1"/>
+                                          </p:val>
+                                        </p:tav>
+                                      </p:tavLst>
+                                    </p:anim>
+                                    <p:anim calcmode="lin" valueType="num">
+                                      <p:cBhvr>
+                                        <p:cTn id="11" dur="332" tmFilter="0, 0; 0.125,0.2665; 0.25,0.4; 0.375,0.465; 0.5,0.5;  0.625,0.535; 0.75,0.6; 0.875,0.7335; 1,1">
+                                          <p:stCondLst>
+                                            <p:cond delay="1324"/>
+                                          </p:stCondLst>
+                                        </p:cTn>
+                                        <p:tgtEl>
+                                          <p:spTgt spid="2050"/>
+                                        </p:tgtEl>
+                                        <p:attrNameLst>
+                                          <p:attrName>ppt_y</p:attrName>
+                                        </p:attrNameLst>
+                                      </p:cBhvr>
+                                      <p:tavLst>
+                                        <p:tav tm="0" fmla="#ppt_y-sin(pi*$)/27">
+                                          <p:val>
+                                            <p:fltVal val="0"/>
+                                          </p:val>
+                                        </p:tav>
+                                        <p:tav tm="100000">
+                                          <p:val>
+                                            <p:fltVal val="1"/>
+                                          </p:val>
+                                        </p:tav>
+                                      </p:tavLst>
+                                    </p:anim>
+                                    <p:anim calcmode="lin" valueType="num">
+                                      <p:cBhvr>
+                                        <p:cTn id="12" dur="164" tmFilter="0, 0; 0.125,0.2665; 0.25,0.4; 0.375,0.465; 0.5,0.5;  0.625,0.535; 0.75,0.6; 0.875,0.7335; 1,1">
+                                          <p:stCondLst>
+                                            <p:cond delay="1656"/>
+                                          </p:stCondLst>
+                                        </p:cTn>
+                                        <p:tgtEl>
+                                          <p:spTgt spid="2050"/>
+                                        </p:tgtEl>
+                                        <p:attrNameLst>
+                                          <p:attrName>ppt_y</p:attrName>
+                                        </p:attrNameLst>
+                                      </p:cBhvr>
+                                      <p:tavLst>
+                                        <p:tav tm="0" fmla="#ppt_y-sin(pi*$)/81">
+                                          <p:val>
+                                            <p:fltVal val="0"/>
+                                          </p:val>
+                                        </p:tav>
+                                        <p:tav tm="100000">
+                                          <p:val>
+                                            <p:fltVal val="1"/>
+                                          </p:val>
+                                        </p:tav>
+                                      </p:tavLst>
+                                    </p:anim>
+                                    <p:animScale>
+                                      <p:cBhvr>
+                                        <p:cTn id="13" dur="26">
+                                          <p:stCondLst>
+                                            <p:cond delay="650"/>
+                                          </p:stCondLst>
+                                        </p:cTn>
+                                        <p:tgtEl>
+                                          <p:spTgt spid="2050"/>
+                                        </p:tgtEl>
+                                      </p:cBhvr>
+                                      <p:to x="100000" y="60000"/>
+                                    </p:animScale>
+                                    <p:animScale>
+                                      <p:cBhvr>
+                                        <p:cTn id="14" dur="166" decel="50000">
+                                          <p:stCondLst>
+                                            <p:cond delay="676"/>
+                                          </p:stCondLst>
+                                        </p:cTn>
+                                        <p:tgtEl>
+                                          <p:spTgt spid="2050"/>
+                                        </p:tgtEl>
+                                      </p:cBhvr>
+                                      <p:to x="100000" y="100000"/>
+                                    </p:animScale>
+                                    <p:animScale>
+                                      <p:cBhvr>
+                                        <p:cTn id="15" dur="26">
+                                          <p:stCondLst>
+                                            <p:cond delay="1312"/>
+                                          </p:stCondLst>
+                                        </p:cTn>
+                                        <p:tgtEl>
+                                          <p:spTgt spid="2050"/>
+                                        </p:tgtEl>
+                                      </p:cBhvr>
+                                      <p:to x="100000" y="80000"/>
+                                    </p:animScale>
+                                    <p:animScale>
+                                      <p:cBhvr>
+                                        <p:cTn id="16" dur="166" decel="50000">
+                                          <p:stCondLst>
+                                            <p:cond delay="1338"/>
+                                          </p:stCondLst>
+                                        </p:cTn>
+                                        <p:tgtEl>
+                                          <p:spTgt spid="2050"/>
+                                        </p:tgtEl>
+                                      </p:cBhvr>
+                                      <p:to x="100000" y="100000"/>
+                                    </p:animScale>
+                                    <p:animScale>
+                                      <p:cBhvr>
+                                        <p:cTn id="17" dur="26">
+                                          <p:stCondLst>
+                                            <p:cond delay="1642"/>
+                                          </p:stCondLst>
+                                        </p:cTn>
+                                        <p:tgtEl>
+                                          <p:spTgt spid="2050"/>
+                                        </p:tgtEl>
+                                      </p:cBhvr>
+                                      <p:to x="100000" y="90000"/>
+                                    </p:animScale>
+                                    <p:animScale>
+                                      <p:cBhvr>
+                                        <p:cTn id="18" dur="166" decel="50000">
+                                          <p:stCondLst>
+                                            <p:cond delay="1668"/>
+                                          </p:stCondLst>
+                                        </p:cTn>
+                                        <p:tgtEl>
+                                          <p:spTgt spid="2050"/>
+                                        </p:tgtEl>
+                                      </p:cBhvr>
+                                      <p:to x="100000" y="100000"/>
+                                    </p:animScale>
+                                    <p:animScale>
+                                      <p:cBhvr>
+                                        <p:cTn id="19" dur="26">
+                                          <p:stCondLst>
+                                            <p:cond delay="1808"/>
+                                          </p:stCondLst>
+                                        </p:cTn>
+                                        <p:tgtEl>
+                                          <p:spTgt spid="2050"/>
+                                        </p:tgtEl>
+                                      </p:cBhvr>
+                                      <p:to x="100000" y="95000"/>
+                                    </p:animScale>
+                                    <p:animScale>
+                                      <p:cBhvr>
+                                        <p:cTn id="20" dur="166" decel="50000">
+                                          <p:stCondLst>
+                                            <p:cond delay="1834"/>
+                                          </p:stCondLst>
+                                        </p:cTn>
+                                        <p:tgtEl>
+                                          <p:spTgt spid="2050"/>
+                                        </p:tgtEl>
+                                      </p:cBhvr>
+                                      <p:to x="100000" y="100000"/>
+                                    </p:animScale>
+                                  </p:childTnLst>
+                                </p:cTn>
+                              </p:par>
+                            </p:childTnLst>
+                          </p:cTn>
+                        </p:par>
+                      </p:childTnLst>
+                    </p:cTn>
+                  </p:par>
+                </p:childTnLst>
+              </p:cTn>
+              <p:prevCondLst>
+                <p:cond evt="onPrev" delay="0">
+                  <p:tgtEl>
+                    <p:sldTgt/>
+                  </p:tgtEl>
+                </p:cond>
+              </p:prevCondLst>
+              <p:nextCondLst>
+                <p:cond evt="onNext" delay="0">
+                  <p:tgtEl>
+                    <p:sldTgt/>
+                  </p:tgtEl>
+                </p:cond>
+              </p:nextCondLst>
+            </p:seq>
+          </p:childTnLst>
+        </p:cTn>
+      </p:par>
+    </p:tnLst>
+  </p:timing>
 </p:sld>
 </file>
 
@@ -5021,9 +6162,10 @@
           <a:lstStyle/>
           <a:p>
             <a:r>
-              <a:rPr lang="en-US"/>
-              <a:t>The Team</a:t>
-            </a:r>
+              <a:rPr lang="en-US" dirty="0" err="1" smtClean="0"/>
+              <a:t>L’équipe</a:t>
+            </a:r>
+            <a:endParaRPr lang="en-US" dirty="0"/>
           </a:p>
         </p:txBody>
       </p:sp>
@@ -5043,29 +6185,131 @@
           <a:lstStyle/>
           <a:p>
             <a:r>
-              <a:rPr lang="en-US"/>
-              <a:t>List CEO and key management by name.</a:t>
-            </a:r>
-          </a:p>
-          <a:p>
-            <a:r>
-              <a:rPr lang="en-US"/>
-              <a:t>Include previous accomplishments to show that these are people with a record of success.</a:t>
-            </a:r>
-          </a:p>
-          <a:p>
-            <a:r>
-              <a:rPr lang="en-US"/>
-              <a:t>Summarize number of years of experience in this field.</a:t>
-            </a:r>
+              <a:rPr lang="en-US" dirty="0" smtClean="0"/>
+              <a:t>PDG</a:t>
+            </a:r>
+            <a:r>
+              <a:rPr lang="en-US" dirty="0" smtClean="0"/>
+              <a:t>: Jean MINOUFLET</a:t>
+            </a:r>
+            <a:endParaRPr lang="fr-FR" dirty="0" smtClean="0"/>
+          </a:p>
+          <a:p>
+            <a:pPr lvl="1"/>
+            <a:r>
+              <a:rPr lang="fr-FR" dirty="0" smtClean="0"/>
+              <a:t>Démarchage de client, Publicité, Communication</a:t>
+            </a:r>
+          </a:p>
+          <a:p>
+            <a:r>
+              <a:rPr lang="en-US" dirty="0" smtClean="0"/>
+              <a:t>Manager development: Boris LIBERKOWSKI</a:t>
+            </a:r>
+          </a:p>
+          <a:p>
+            <a:pPr lvl="1"/>
+            <a:r>
+              <a:rPr lang="fr-FR" dirty="0" smtClean="0"/>
+              <a:t>Développement de la solution, Adaptation client, choix des technologies, recherche.</a:t>
+            </a:r>
+            <a:endParaRPr lang="en-US" dirty="0" smtClean="0"/>
+          </a:p>
+          <a:p>
+            <a:r>
+              <a:rPr lang="fr-FR" dirty="0" smtClean="0"/>
+              <a:t>Développeur</a:t>
+            </a:r>
+            <a:r>
+              <a:rPr lang="fr-FR" dirty="0" smtClean="0"/>
+              <a:t> : </a:t>
+            </a:r>
+            <a:r>
+              <a:rPr lang="fr-FR" dirty="0" err="1" smtClean="0"/>
+              <a:t>Zouhair</a:t>
+            </a:r>
+            <a:r>
+              <a:rPr lang="fr-FR" dirty="0" smtClean="0"/>
+              <a:t> GUIJJANE</a:t>
+            </a:r>
+          </a:p>
+          <a:p>
+            <a:pPr lvl="1"/>
+            <a:r>
+              <a:rPr lang="fr-FR" dirty="0" smtClean="0"/>
+              <a:t>Développement de la solution, Adaptation client, </a:t>
+            </a:r>
+            <a:endParaRPr lang="en-US" dirty="0"/>
+          </a:p>
+          <a:p>
+            <a:r>
+              <a:rPr lang="fr-FR" dirty="0" smtClean="0"/>
+              <a:t>Administrateur Système &amp; Réseau: Arnaud KANDIN</a:t>
+            </a:r>
+          </a:p>
+          <a:p>
+            <a:pPr lvl="1"/>
+            <a:r>
+              <a:rPr lang="fr-FR" dirty="0" smtClean="0"/>
+              <a:t>Design des architectures systèmes et réseaux, maintenance sur site.</a:t>
+            </a:r>
+            <a:endParaRPr lang="en-US" dirty="0"/>
           </a:p>
         </p:txBody>
       </p:sp>
+      <p:pic>
+        <p:nvPicPr>
+          <p:cNvPr id="4" name="Picture 2" descr="C:\Users\e8k\Documents\GitHub\NightLife\Art\nightsoft 1.png"/>
+          <p:cNvPicPr>
+            <a:picLocks noChangeAspect="1" noChangeArrowheads="1"/>
+          </p:cNvPicPr>
+          <p:nvPr/>
+        </p:nvPicPr>
+        <p:blipFill>
+          <a:blip r:embed="rId2">
+            <a:extLst>
+              <a:ext uri="{28A0092B-C50C-407E-A947-70E740481C1C}">
+                <a14:useLocalDpi xmlns:a14="http://schemas.microsoft.com/office/drawing/2010/main" val="0"/>
+              </a:ext>
+            </a:extLst>
+          </a:blip>
+          <a:srcRect/>
+          <a:stretch>
+            <a:fillRect/>
+          </a:stretch>
+        </p:blipFill>
+        <p:spPr bwMode="auto">
+          <a:xfrm>
+            <a:off x="48356" y="44624"/>
+            <a:ext cx="1673768" cy="1692027"/>
+          </a:xfrm>
+          <a:prstGeom prst="rect">
+            <a:avLst/>
+          </a:prstGeom>
+          <a:noFill/>
+          <a:extLst>
+            <a:ext uri="{909E8E84-426E-40DD-AFC4-6F175D3DCCD1}">
+              <a14:hiddenFill xmlns:a14="http://schemas.microsoft.com/office/drawing/2010/main">
+                <a:solidFill>
+                  <a:srgbClr val="FFFFFF"/>
+                </a:solidFill>
+              </a14:hiddenFill>
+            </a:ext>
+          </a:extLst>
+        </p:spPr>
+      </p:pic>
     </p:spTree>
   </p:cSld>
   <p:clrMapOvr>
     <a:masterClrMapping/>
   </p:clrMapOvr>
+  <p:timing>
+    <p:tnLst>
+      <p:par>
+        <p:cTn id="1" dur="indefinite" restart="never" nodeType="tmRoot"/>
+      </p:par>
+    </p:tnLst>
+  </p:timing>
 </p:sld>
 </file>
 
@@ -5102,41 +6346,576 @@
           <a:lstStyle/>
           <a:p>
             <a:r>
-              <a:rPr lang="en-US"/>
-              <a:t>Market Summary</a:t>
-            </a:r>
+              <a:rPr lang="en-US" dirty="0" err="1" smtClean="0"/>
+              <a:t>Présence</a:t>
+            </a:r>
+            <a:r>
+              <a:rPr lang="en-US" dirty="0" smtClean="0"/>
+              <a:t> &amp; </a:t>
+            </a:r>
+            <a:r>
+              <a:rPr lang="en-US" dirty="0" err="1" smtClean="0"/>
+              <a:t>concurence</a:t>
+            </a:r>
+            <a:r>
+              <a:rPr lang="en-US" dirty="0" smtClean="0"/>
+              <a:t> </a:t>
+            </a:r>
+            <a:r>
+              <a:rPr lang="en-US" dirty="0" err="1" smtClean="0"/>
+              <a:t>sur</a:t>
+            </a:r>
+            <a:r>
+              <a:rPr lang="en-US" dirty="0" smtClean="0"/>
+              <a:t> </a:t>
+            </a:r>
+            <a:r>
+              <a:rPr lang="en-US" dirty="0" err="1" smtClean="0"/>
+              <a:t>marché</a:t>
+            </a:r>
+            <a:endParaRPr lang="en-US" dirty="0"/>
           </a:p>
         </p:txBody>
       </p:sp>
-      <p:sp>
-        <p:nvSpPr>
-          <p:cNvPr id="19459" name="Rectangle 3"/>
-          <p:cNvSpPr>
-            <a:spLocks noGrp="1" noChangeArrowheads="1"/>
-          </p:cNvSpPr>
+      <p:pic>
+        <p:nvPicPr>
+          <p:cNvPr id="4" name="Picture 2" descr="C:\Users\e8k\Documents\GitHub\NightLife\Art\nightsoft 1.png"/>
+          <p:cNvPicPr>
+            <a:picLocks noChangeAspect="1" noChangeArrowheads="1"/>
+          </p:cNvPicPr>
+          <p:nvPr/>
+        </p:nvPicPr>
+        <p:blipFill>
+          <a:blip r:embed="rId2">
+            <a:extLst>
+              <a:ext uri="{28A0092B-C50C-407E-A947-70E740481C1C}">
+                <a14:useLocalDpi xmlns:a14="http://schemas.microsoft.com/office/drawing/2010/main" val="0"/>
+              </a:ext>
+            </a:extLst>
+          </a:blip>
+          <a:srcRect/>
+          <a:stretch>
+            <a:fillRect/>
+          </a:stretch>
+        </p:blipFill>
+        <p:spPr bwMode="auto">
+          <a:xfrm>
+            <a:off x="48356" y="44624"/>
+            <a:ext cx="1673768" cy="1692027"/>
+          </a:xfrm>
+          <a:prstGeom prst="rect">
+            <a:avLst/>
+          </a:prstGeom>
+          <a:noFill/>
+          <a:extLst>
+            <a:ext uri="{909E8E84-426E-40DD-AFC4-6F175D3DCCD1}">
+              <a14:hiddenFill xmlns:a14="http://schemas.microsoft.com/office/drawing/2010/main">
+                <a:solidFill>
+                  <a:srgbClr val="FFFFFF"/>
+                </a:solidFill>
+              </a14:hiddenFill>
+            </a:ext>
+          </a:extLst>
+        </p:spPr>
+      </p:pic>
+      <p:graphicFrame>
+        <p:nvGraphicFramePr>
+          <p:cNvPr id="7" name="Table 6"/>
+          <p:cNvGraphicFramePr>
+            <a:graphicFrameLocks noGrp="1"/>
+          </p:cNvGraphicFramePr>
           <p:nvPr>
-            <p:ph type="body" idx="1"/>
+            <p:extLst>
+              <p:ext uri="{D42A27DB-BD31-4B8C-83A1-F6EECF244321}">
+                <p14:modId xmlns:p14="http://schemas.microsoft.com/office/powerpoint/2010/main" val="3801464145"/>
+              </p:ext>
+            </p:extLst>
           </p:nvPr>
-        </p:nvSpPr>
-        <p:spPr/>
-        <p:txBody>
-          <a:bodyPr/>
-          <a:lstStyle/>
-          <a:p>
-            <a:r>
-              <a:rPr lang="en-US"/>
-              <a:t>Summarize your market in the past, present, and future.</a:t>
-            </a:r>
-          </a:p>
-          <a:p>
-            <a:pPr lvl="1"/>
-            <a:r>
-              <a:rPr lang="en-US"/>
-              <a:t>Review those changes in market share, leadership, players, market shifts, costs, pricing, or competition that provide the opportunity for your company’s success.</a:t>
-            </a:r>
-          </a:p>
-        </p:txBody>
-      </p:sp>
+        </p:nvGraphicFramePr>
+        <p:xfrm>
+          <a:off x="1907704" y="1988840"/>
+          <a:ext cx="6984776" cy="4140621"/>
+        </p:xfrm>
+        <a:graphic>
+          <a:graphicData uri="http://schemas.openxmlformats.org/drawingml/2006/table">
+            <a:tbl>
+              <a:tblPr>
+                <a:tableStyleId>{5C22544A-7EE6-4342-B048-85BDC9FD1C3A}</a:tableStyleId>
+              </a:tblPr>
+              <a:tblGrid>
+                <a:gridCol w="3492388"/>
+                <a:gridCol w="3492388"/>
+              </a:tblGrid>
+              <a:tr h="1174378">
+                <a:tc>
+                  <a:txBody>
+                    <a:bodyPr/>
+                    <a:lstStyle/>
+                    <a:p>
+                      <a:pPr marL="0" marR="0">
+                        <a:lnSpc>
+                          <a:spcPct val="115000"/>
+                        </a:lnSpc>
+                        <a:spcBef>
+                          <a:spcPts val="0"/>
+                        </a:spcBef>
+                        <a:spcAft>
+                          <a:spcPts val="0"/>
+                        </a:spcAft>
+                      </a:pPr>
+                      <a:r>
+                        <a:rPr lang="en-US" sz="2000" b="1" dirty="0">
+                          <a:solidFill>
+                            <a:schemeClr val="tx1"/>
+                          </a:solidFill>
+                          <a:effectLst/>
+                        </a:rPr>
+                        <a:t>Forces</a:t>
+                      </a:r>
+                      <a:endParaRPr lang="en-US" sz="1800" b="1" dirty="0">
+                        <a:solidFill>
+                          <a:schemeClr val="tx1"/>
+                        </a:solidFill>
+                        <a:effectLst/>
+                      </a:endParaRPr>
+                    </a:p>
+                    <a:p>
+                      <a:pPr marL="342900" marR="0" lvl="0" indent="-342900">
+                        <a:lnSpc>
+                          <a:spcPct val="115000"/>
+                        </a:lnSpc>
+                        <a:spcBef>
+                          <a:spcPts val="0"/>
+                        </a:spcBef>
+                        <a:spcAft>
+                          <a:spcPts val="0"/>
+                        </a:spcAft>
+                        <a:buFont typeface="Arial"/>
+                        <a:buChar char="•"/>
+                      </a:pPr>
+                      <a:r>
+                        <a:rPr lang="fr-FR" sz="1800" b="0" dirty="0">
+                          <a:solidFill>
+                            <a:schemeClr val="tx1"/>
+                          </a:solidFill>
+                          <a:effectLst/>
+                        </a:rPr>
+                        <a:t>Innovation sur le marché</a:t>
+                      </a:r>
+                      <a:endParaRPr lang="en-US" sz="1600" b="0" dirty="0">
+                        <a:solidFill>
+                          <a:schemeClr val="tx1"/>
+                        </a:solidFill>
+                        <a:effectLst/>
+                      </a:endParaRPr>
+                    </a:p>
+                    <a:p>
+                      <a:pPr marL="0" marR="0">
+                        <a:lnSpc>
+                          <a:spcPct val="115000"/>
+                        </a:lnSpc>
+                        <a:spcBef>
+                          <a:spcPts val="0"/>
+                        </a:spcBef>
+                        <a:spcAft>
+                          <a:spcPts val="0"/>
+                        </a:spcAft>
+                      </a:pPr>
+                      <a:r>
+                        <a:rPr lang="fr-FR" sz="1800" b="1" dirty="0">
+                          <a:solidFill>
+                            <a:schemeClr val="tx1"/>
+                          </a:solidFill>
+                          <a:effectLst/>
+                        </a:rPr>
+                        <a:t> </a:t>
+                      </a:r>
+                      <a:endParaRPr lang="en-US" sz="1600" b="1" dirty="0">
+                        <a:solidFill>
+                          <a:schemeClr val="tx1"/>
+                        </a:solidFill>
+                        <a:effectLst/>
+                        <a:latin typeface="Calibri"/>
+                        <a:ea typeface="Times New Roman"/>
+                        <a:cs typeface="Times New Roman"/>
+                      </a:endParaRPr>
+                    </a:p>
+                  </a:txBody>
+                  <a:tcPr marL="68580" marR="68580" marT="0" marB="0">
+                    <a:noFill/>
+                  </a:tcPr>
+                </a:tc>
+                <a:tc>
+                  <a:txBody>
+                    <a:bodyPr/>
+                    <a:lstStyle/>
+                    <a:p>
+                      <a:pPr marL="0" marR="0">
+                        <a:lnSpc>
+                          <a:spcPct val="115000"/>
+                        </a:lnSpc>
+                        <a:spcBef>
+                          <a:spcPts val="0"/>
+                        </a:spcBef>
+                        <a:spcAft>
+                          <a:spcPts val="0"/>
+                        </a:spcAft>
+                      </a:pPr>
+                      <a:r>
+                        <a:rPr lang="fr-FR" sz="2000" b="1" dirty="0">
+                          <a:solidFill>
+                            <a:schemeClr val="tx1"/>
+                          </a:solidFill>
+                          <a:effectLst/>
+                        </a:rPr>
+                        <a:t>Faiblesses</a:t>
+                      </a:r>
+                      <a:endParaRPr lang="en-US" sz="1600" b="1" dirty="0">
+                        <a:solidFill>
+                          <a:schemeClr val="tx1"/>
+                        </a:solidFill>
+                        <a:effectLst/>
+                      </a:endParaRPr>
+                    </a:p>
+                    <a:p>
+                      <a:pPr marL="342900" marR="0" lvl="0" indent="-342900">
+                        <a:lnSpc>
+                          <a:spcPct val="115000"/>
+                        </a:lnSpc>
+                        <a:spcBef>
+                          <a:spcPts val="0"/>
+                        </a:spcBef>
+                        <a:spcAft>
+                          <a:spcPts val="0"/>
+                        </a:spcAft>
+                        <a:buFont typeface="Arial"/>
+                        <a:buChar char="•"/>
+                      </a:pPr>
+                      <a:r>
+                        <a:rPr lang="en-US" sz="1800" b="0" dirty="0">
+                          <a:solidFill>
+                            <a:schemeClr val="tx1"/>
+                          </a:solidFill>
+                          <a:effectLst/>
+                        </a:rPr>
+                        <a:t>Concept non deposable</a:t>
+                      </a:r>
+                      <a:endParaRPr lang="en-US" sz="1600" b="0" dirty="0">
+                        <a:solidFill>
+                          <a:schemeClr val="tx1"/>
+                        </a:solidFill>
+                        <a:effectLst/>
+                        <a:latin typeface="Calibri"/>
+                        <a:ea typeface="Times New Roman"/>
+                        <a:cs typeface="Times New Roman"/>
+                      </a:endParaRPr>
+                    </a:p>
+                  </a:txBody>
+                  <a:tcPr marL="68580" marR="68580" marT="0" marB="0">
+                    <a:noFill/>
+                  </a:tcPr>
+                </a:tc>
+              </a:tr>
+              <a:tr h="2966243">
+                <a:tc>
+                  <a:txBody>
+                    <a:bodyPr/>
+                    <a:lstStyle/>
+                    <a:p>
+                      <a:pPr marL="0" marR="0">
+                        <a:lnSpc>
+                          <a:spcPct val="115000"/>
+                        </a:lnSpc>
+                        <a:spcBef>
+                          <a:spcPts val="0"/>
+                        </a:spcBef>
+                        <a:spcAft>
+                          <a:spcPts val="0"/>
+                        </a:spcAft>
+                      </a:pPr>
+                      <a:r>
+                        <a:rPr lang="fr-FR" sz="2000" b="1" dirty="0" err="1">
+                          <a:solidFill>
+                            <a:schemeClr val="tx1"/>
+                          </a:solidFill>
+                          <a:effectLst/>
+                        </a:rPr>
+                        <a:t>Opportunitées</a:t>
+                      </a:r>
+                      <a:endParaRPr lang="en-US" sz="1600" b="1" dirty="0">
+                        <a:solidFill>
+                          <a:schemeClr val="tx1"/>
+                        </a:solidFill>
+                        <a:effectLst/>
+                      </a:endParaRPr>
+                    </a:p>
+                    <a:p>
+                      <a:pPr marL="342900" marR="0" lvl="0" indent="-342900">
+                        <a:lnSpc>
+                          <a:spcPct val="115000"/>
+                        </a:lnSpc>
+                        <a:spcBef>
+                          <a:spcPts val="0"/>
+                        </a:spcBef>
+                        <a:spcAft>
+                          <a:spcPts val="0"/>
+                        </a:spcAft>
+                        <a:buFont typeface="Arial"/>
+                        <a:buChar char="•"/>
+                      </a:pPr>
+                      <a:r>
+                        <a:rPr lang="en-US" sz="1800" b="0" dirty="0">
+                          <a:solidFill>
+                            <a:schemeClr val="tx1"/>
+                          </a:solidFill>
+                          <a:effectLst/>
+                        </a:rPr>
+                        <a:t>Pas de concurrent</a:t>
+                      </a:r>
+                      <a:endParaRPr lang="en-US" sz="1600" b="0" dirty="0">
+                        <a:solidFill>
+                          <a:schemeClr val="tx1"/>
+                        </a:solidFill>
+                        <a:effectLst/>
+                      </a:endParaRPr>
+                    </a:p>
+                    <a:p>
+                      <a:pPr marL="342900" marR="0" lvl="0" indent="-342900">
+                        <a:lnSpc>
+                          <a:spcPct val="115000"/>
+                        </a:lnSpc>
+                        <a:spcBef>
+                          <a:spcPts val="0"/>
+                        </a:spcBef>
+                        <a:spcAft>
+                          <a:spcPts val="0"/>
+                        </a:spcAft>
+                        <a:buFont typeface="Arial"/>
+                        <a:buChar char="•"/>
+                      </a:pPr>
+                      <a:r>
+                        <a:rPr lang="en-US" sz="1800" b="0" dirty="0">
+                          <a:solidFill>
+                            <a:schemeClr val="tx1"/>
+                          </a:solidFill>
+                          <a:effectLst/>
+                        </a:rPr>
+                        <a:t>Un </a:t>
+                      </a:r>
+                      <a:r>
+                        <a:rPr lang="fr-FR" sz="1800" b="0" dirty="0">
+                          <a:solidFill>
+                            <a:schemeClr val="tx1"/>
+                          </a:solidFill>
+                          <a:effectLst/>
+                        </a:rPr>
+                        <a:t>marché</a:t>
+                      </a:r>
+                      <a:r>
+                        <a:rPr lang="en-US" sz="1800" b="0" dirty="0">
+                          <a:solidFill>
+                            <a:schemeClr val="tx1"/>
+                          </a:solidFill>
+                          <a:effectLst/>
+                        </a:rPr>
+                        <a:t> </a:t>
+                      </a:r>
+                      <a:r>
+                        <a:rPr lang="en-US" sz="1800" b="0" dirty="0" err="1">
+                          <a:solidFill>
+                            <a:schemeClr val="tx1"/>
+                          </a:solidFill>
+                          <a:effectLst/>
+                        </a:rPr>
+                        <a:t>investisseur</a:t>
+                      </a:r>
+                      <a:r>
+                        <a:rPr lang="en-US" sz="1800" b="0" dirty="0">
+                          <a:solidFill>
+                            <a:schemeClr val="tx1"/>
+                          </a:solidFill>
+                          <a:effectLst/>
+                        </a:rPr>
+                        <a:t>,</a:t>
+                      </a:r>
+                      <a:endParaRPr lang="en-US" sz="1600" b="0" dirty="0">
+                        <a:solidFill>
+                          <a:schemeClr val="tx1"/>
+                        </a:solidFill>
+                        <a:effectLst/>
+                      </a:endParaRPr>
+                    </a:p>
+                    <a:p>
+                      <a:pPr marL="0" marR="0">
+                        <a:lnSpc>
+                          <a:spcPct val="115000"/>
+                        </a:lnSpc>
+                        <a:spcBef>
+                          <a:spcPts val="0"/>
+                        </a:spcBef>
+                        <a:spcAft>
+                          <a:spcPts val="0"/>
+                        </a:spcAft>
+                      </a:pPr>
+                      <a:r>
+                        <a:rPr lang="en-US" sz="1800" b="1" dirty="0">
+                          <a:solidFill>
+                            <a:schemeClr val="tx1"/>
+                          </a:solidFill>
+                          <a:effectLst/>
+                        </a:rPr>
+                        <a:t> </a:t>
+                      </a:r>
+                      <a:endParaRPr lang="en-US" sz="1600" b="1" dirty="0">
+                        <a:solidFill>
+                          <a:schemeClr val="tx1"/>
+                        </a:solidFill>
+                        <a:effectLst/>
+                        <a:latin typeface="Calibri"/>
+                        <a:ea typeface="Times New Roman"/>
+                        <a:cs typeface="Times New Roman"/>
+                      </a:endParaRPr>
+                    </a:p>
+                  </a:txBody>
+                  <a:tcPr marL="68580" marR="68580" marT="0" marB="0">
+                    <a:noFill/>
+                  </a:tcPr>
+                </a:tc>
+                <a:tc>
+                  <a:txBody>
+                    <a:bodyPr/>
+                    <a:lstStyle/>
+                    <a:p>
+                      <a:pPr marL="0" marR="0">
+                        <a:lnSpc>
+                          <a:spcPct val="115000"/>
+                        </a:lnSpc>
+                        <a:spcBef>
+                          <a:spcPts val="0"/>
+                        </a:spcBef>
+                        <a:spcAft>
+                          <a:spcPts val="0"/>
+                        </a:spcAft>
+                      </a:pPr>
+                      <a:r>
+                        <a:rPr lang="en-US" sz="2000" b="1" dirty="0">
+                          <a:solidFill>
+                            <a:schemeClr val="tx1"/>
+                          </a:solidFill>
+                          <a:effectLst/>
+                        </a:rPr>
+                        <a:t>Menaces</a:t>
+                      </a:r>
+                      <a:endParaRPr lang="en-US" sz="1600" b="1" dirty="0">
+                        <a:solidFill>
+                          <a:schemeClr val="tx1"/>
+                        </a:solidFill>
+                        <a:effectLst/>
+                      </a:endParaRPr>
+                    </a:p>
+                    <a:p>
+                      <a:pPr marL="342900" marR="0" lvl="0" indent="-342900">
+                        <a:lnSpc>
+                          <a:spcPct val="115000"/>
+                        </a:lnSpc>
+                        <a:spcBef>
+                          <a:spcPts val="0"/>
+                        </a:spcBef>
+                        <a:spcAft>
+                          <a:spcPts val="0"/>
+                        </a:spcAft>
+                        <a:buFont typeface="Arial"/>
+                        <a:buChar char="•"/>
+                      </a:pPr>
+                      <a:r>
+                        <a:rPr lang="en-US" sz="1800" b="0" dirty="0">
+                          <a:solidFill>
+                            <a:schemeClr val="tx1"/>
+                          </a:solidFill>
+                          <a:effectLst/>
+                        </a:rPr>
+                        <a:t>Apparition d’un concurrent,</a:t>
+                      </a:r>
+                      <a:endParaRPr lang="en-US" sz="1600" b="0" dirty="0">
+                        <a:solidFill>
+                          <a:schemeClr val="tx1"/>
+                        </a:solidFill>
+                        <a:effectLst/>
+                      </a:endParaRPr>
+                    </a:p>
+                    <a:p>
+                      <a:pPr marL="342900" marR="0" lvl="0" indent="-342900">
+                        <a:lnSpc>
+                          <a:spcPct val="115000"/>
+                        </a:lnSpc>
+                        <a:spcBef>
+                          <a:spcPts val="0"/>
+                        </a:spcBef>
+                        <a:spcAft>
+                          <a:spcPts val="0"/>
+                        </a:spcAft>
+                        <a:buFont typeface="Arial"/>
+                        <a:buChar char="•"/>
+                      </a:pPr>
+                      <a:r>
+                        <a:rPr lang="fr-FR" sz="1800" b="0" dirty="0">
+                          <a:solidFill>
+                            <a:schemeClr val="tx1"/>
+                          </a:solidFill>
+                          <a:effectLst/>
+                        </a:rPr>
+                        <a:t>Refus d’héberger l’application par le Play Store ou l’Apple Store,</a:t>
+                      </a:r>
+                      <a:endParaRPr lang="en-US" sz="1600" b="0" dirty="0">
+                        <a:solidFill>
+                          <a:schemeClr val="tx1"/>
+                        </a:solidFill>
+                        <a:effectLst/>
+                      </a:endParaRPr>
+                    </a:p>
+                    <a:p>
+                      <a:pPr marL="342900" marR="0" lvl="0" indent="-342900">
+                        <a:lnSpc>
+                          <a:spcPct val="115000"/>
+                        </a:lnSpc>
+                        <a:spcBef>
+                          <a:spcPts val="0"/>
+                        </a:spcBef>
+                        <a:spcAft>
+                          <a:spcPts val="0"/>
+                        </a:spcAft>
+                        <a:buFont typeface="Arial"/>
+                        <a:buChar char="•"/>
+                      </a:pPr>
+                      <a:r>
+                        <a:rPr lang="fr-FR" sz="1800" b="0" dirty="0">
+                          <a:solidFill>
+                            <a:schemeClr val="tx1"/>
+                          </a:solidFill>
+                          <a:effectLst/>
+                        </a:rPr>
+                        <a:t>Reprise de l’idée avec une technologie différente.</a:t>
+                      </a:r>
+                      <a:endParaRPr lang="en-US" sz="1600" b="0" dirty="0">
+                        <a:solidFill>
+                          <a:schemeClr val="tx1"/>
+                        </a:solidFill>
+                        <a:effectLst/>
+                        <a:latin typeface="Calibri"/>
+                        <a:ea typeface="Times New Roman"/>
+                        <a:cs typeface="Times New Roman"/>
+                      </a:endParaRPr>
+                    </a:p>
+                  </a:txBody>
+                  <a:tcPr marL="68580" marR="68580" marT="0" marB="0">
+                    <a:noFill/>
+                  </a:tcPr>
+                </a:tc>
+              </a:tr>
+            </a:tbl>
+          </a:graphicData>
+        </a:graphic>
+      </p:graphicFrame>
     </p:spTree>
   </p:cSld>
   <p:clrMapOvr>
@@ -5171,7 +6950,7 @@
       </p:grpSpPr>
       <p:sp>
         <p:nvSpPr>
-          <p:cNvPr id="20482" name="Rectangle 2"/>
+          <p:cNvPr id="23554" name="Rectangle 2"/>
           <p:cNvSpPr>
             <a:spLocks noGrp="1" noChangeArrowheads="1"/>
           </p:cNvSpPr>
@@ -5185,15 +6964,16 @@
           <a:lstStyle/>
           <a:p>
             <a:r>
-              <a:rPr lang="en-US"/>
-              <a:t>Opportunities</a:t>
-            </a:r>
+              <a:rPr lang="fr-FR" dirty="0"/>
+              <a:t>Clientèle visée :</a:t>
+            </a:r>
+            <a:endParaRPr lang="en-US" dirty="0"/>
           </a:p>
         </p:txBody>
       </p:sp>
       <p:sp>
         <p:nvSpPr>
-          <p:cNvPr id="20483" name="Rectangle 3"/>
+          <p:cNvPr id="23555" name="Rectangle 3"/>
           <p:cNvSpPr>
             <a:spLocks noGrp="1" noChangeArrowheads="1"/>
           </p:cNvSpPr>
@@ -5201,25 +6981,130 @@
             <p:ph type="body" idx="1"/>
           </p:nvPr>
         </p:nvSpPr>
-        <p:spPr/>
+        <p:spPr>
+          <a:xfrm>
+            <a:off x="1905000" y="1447800"/>
+            <a:ext cx="6934200" cy="5005536"/>
+          </a:xfrm>
+        </p:spPr>
         <p:txBody>
           <a:bodyPr/>
           <a:lstStyle/>
           <a:p>
             <a:r>
-              <a:rPr lang="en-US"/>
-              <a:t>Identify problems and opportunities.</a:t>
-            </a:r>
+              <a:rPr lang="fr-FR" dirty="0" smtClean="0"/>
+              <a:t>Notre </a:t>
+            </a:r>
+            <a:r>
+              <a:rPr lang="fr-FR" dirty="0"/>
+              <a:t>logiciel sera conçu de façon agile, nous pourrons ainsi faire évoluer facilement notre logiciel en fonction des besoins des différents clients</a:t>
+            </a:r>
+            <a:r>
+              <a:rPr lang="fr-FR" dirty="0" smtClean="0"/>
+              <a:t>.</a:t>
+            </a:r>
+          </a:p>
+          <a:p>
+            <a:r>
+              <a:rPr lang="fr-FR" dirty="0" smtClean="0"/>
+              <a:t>Nous pourrons ainsi être présent sur différents secteurs.</a:t>
+            </a:r>
+            <a:endParaRPr lang="en-US" dirty="0"/>
+          </a:p>
+          <a:p>
+            <a:r>
+              <a:rPr lang="fr-FR" sz="2400" b="1" i="1" u="sng" dirty="0"/>
+              <a:t>Nos clients seront par exemple </a:t>
+            </a:r>
+            <a:r>
+              <a:rPr lang="fr-FR" sz="2400" b="1" i="1" u="sng" dirty="0" smtClean="0"/>
+              <a:t>:</a:t>
+            </a:r>
+            <a:endParaRPr lang="en-US" sz="2400" b="1" dirty="0"/>
           </a:p>
           <a:p>
             <a:pPr lvl="1"/>
             <a:r>
-              <a:rPr lang="en-US"/>
-              <a:t>State consumer problems, and define the nature of product/service opportunities that are created by those problems.</a:t>
-            </a:r>
+              <a:rPr lang="fr-FR" dirty="0"/>
+              <a:t>Les propriétaires d’entreprise qui ont une interaction directe avec les clients.</a:t>
+            </a:r>
+            <a:endParaRPr lang="en-US" dirty="0"/>
+          </a:p>
+          <a:p>
+            <a:pPr lvl="1"/>
+            <a:r>
+              <a:rPr lang="fr-FR" dirty="0"/>
+              <a:t>Patrons de bar,</a:t>
+            </a:r>
+            <a:endParaRPr lang="en-US" dirty="0"/>
+          </a:p>
+          <a:p>
+            <a:pPr lvl="1"/>
+            <a:r>
+              <a:rPr lang="fr-FR" dirty="0"/>
+              <a:t>Fournisseur de boissons,</a:t>
+            </a:r>
+            <a:endParaRPr lang="en-US" dirty="0"/>
+          </a:p>
+          <a:p>
+            <a:pPr lvl="1"/>
+            <a:r>
+              <a:rPr lang="fr-FR" dirty="0"/>
+              <a:t>Boites de nuit,</a:t>
+            </a:r>
+            <a:endParaRPr lang="en-US" dirty="0"/>
+          </a:p>
+          <a:p>
+            <a:pPr lvl="1"/>
+            <a:r>
+              <a:rPr lang="fr-FR" dirty="0"/>
+              <a:t>Restaurateurs.</a:t>
+            </a:r>
+            <a:endParaRPr lang="en-US" dirty="0"/>
           </a:p>
         </p:txBody>
       </p:sp>
+      <p:pic>
+        <p:nvPicPr>
+          <p:cNvPr id="4" name="Picture 2" descr="C:\Users\e8k\Documents\GitHub\NightLife\Art\nightsoft 1.png"/>
+          <p:cNvPicPr>
+            <a:picLocks noChangeAspect="1" noChangeArrowheads="1"/>
+          </p:cNvPicPr>
+          <p:nvPr/>
+        </p:nvPicPr>
+        <p:blipFill>
+          <a:blip r:embed="rId2">
+            <a:extLst>
+              <a:ext uri="{28A0092B-C50C-407E-A947-70E740481C1C}">
+                <a14:useLocalDpi xmlns:a14="http://schemas.microsoft.com/office/drawing/2010/main" val="0"/>
+              </a:ext>
+            </a:extLst>
+          </a:blip>
+          <a:srcRect/>
+          <a:stretch>
+            <a:fillRect/>
+          </a:stretch>
+        </p:blipFill>
+        <p:spPr bwMode="auto">
+          <a:xfrm>
+            <a:off x="48356" y="44624"/>
+            <a:ext cx="1673768" cy="1692027"/>
+          </a:xfrm>
+          <a:prstGeom prst="rect">
+            <a:avLst/>
+          </a:prstGeom>
+          <a:noFill/>
+          <a:extLst>
+            <a:ext uri="{909E8E84-426E-40DD-AFC4-6F175D3DCCD1}">
+              <a14:hiddenFill xmlns:a14="http://schemas.microsoft.com/office/drawing/2010/main">
+                <a:solidFill>
+                  <a:srgbClr val="FFFFFF"/>
+                </a:solidFill>
+              </a14:hiddenFill>
+            </a:ext>
+          </a:extLst>
+        </p:spPr>
+      </p:pic>
     </p:spTree>
   </p:cSld>
   <p:clrMapOvr>
@@ -5254,7 +7139,7 @@
       </p:grpSpPr>
       <p:sp>
         <p:nvSpPr>
-          <p:cNvPr id="21506" name="Rectangle 2"/>
+          <p:cNvPr id="24578" name="Rectangle 2"/>
           <p:cNvSpPr>
             <a:spLocks noGrp="1" noChangeArrowheads="1"/>
           </p:cNvSpPr>
@@ -5268,15 +7153,16 @@
           <a:lstStyle/>
           <a:p>
             <a:r>
-              <a:rPr lang="en-US"/>
-              <a:t>Business Concept</a:t>
-            </a:r>
+              <a:rPr lang="en-US" dirty="0" err="1" smtClean="0"/>
+              <a:t>Tarifs</a:t>
+            </a:r>
+            <a:endParaRPr lang="en-US" dirty="0"/>
           </a:p>
         </p:txBody>
       </p:sp>
       <p:sp>
         <p:nvSpPr>
-          <p:cNvPr id="21507" name="Rectangle 3"/>
+          <p:cNvPr id="24579" name="Rectangle 3"/>
           <p:cNvSpPr>
             <a:spLocks noGrp="1" noChangeArrowheads="1"/>
           </p:cNvSpPr>
@@ -5290,12 +7176,131 @@
           <a:lstStyle/>
           <a:p>
             <a:r>
-              <a:rPr lang="en-US"/>
-              <a:t>Summarize the key technology, concept, or strategy on which your business is based.</a:t>
-            </a:r>
+              <a:rPr lang="en-US" dirty="0" smtClean="0"/>
+              <a:t>Notre </a:t>
+            </a:r>
+            <a:r>
+              <a:rPr lang="en-US" dirty="0" err="1" smtClean="0"/>
+              <a:t>tarif</a:t>
+            </a:r>
+            <a:r>
+              <a:rPr lang="en-US" dirty="0" smtClean="0"/>
+              <a:t> </a:t>
+            </a:r>
+            <a:r>
+              <a:rPr lang="en-US" dirty="0" err="1" smtClean="0"/>
+              <a:t>fonctionnera</a:t>
+            </a:r>
+            <a:r>
+              <a:rPr lang="en-US" dirty="0" smtClean="0"/>
+              <a:t> de la </a:t>
+            </a:r>
+            <a:r>
+              <a:rPr lang="en-US" dirty="0" err="1" smtClean="0"/>
+              <a:t>façon</a:t>
+            </a:r>
+            <a:r>
+              <a:rPr lang="en-US" dirty="0" smtClean="0"/>
+              <a:t> </a:t>
+            </a:r>
+            <a:r>
+              <a:rPr lang="en-US" dirty="0" err="1" smtClean="0"/>
+              <a:t>suivante</a:t>
+            </a:r>
+            <a:r>
+              <a:rPr lang="en-US" dirty="0" smtClean="0"/>
+              <a:t>:</a:t>
+            </a:r>
+          </a:p>
+          <a:p>
+            <a:pPr lvl="1"/>
+            <a:r>
+              <a:rPr lang="fr-FR" dirty="0"/>
+              <a:t>150 € / Tablette (3 tablette minimum, soit 1 tablette serveur et 2 tablettes client).</a:t>
+            </a:r>
+          </a:p>
+          <a:p>
+            <a:pPr lvl="1"/>
+            <a:r>
+              <a:rPr lang="fr-FR" dirty="0"/>
+              <a:t>50 € / mois pour l’exploitation du logiciel par parc de n tablette (à définir en fonction du client et du nombre de tablette).</a:t>
+            </a:r>
+          </a:p>
+          <a:p>
+            <a:pPr lvl="1"/>
+            <a:r>
+              <a:rPr lang="fr-FR" dirty="0"/>
+              <a:t>Forfait de consulting /maintenance à défini (fonction du client</a:t>
+            </a:r>
+            <a:r>
+              <a:rPr lang="fr-FR" dirty="0" smtClean="0"/>
+              <a:t>).</a:t>
+            </a:r>
+            <a:endParaRPr lang="en-US" dirty="0" smtClean="0"/>
+          </a:p>
+          <a:p>
+            <a:r>
+              <a:rPr lang="fr-FR" dirty="0" smtClean="0"/>
+              <a:t>Exemple, </a:t>
+            </a:r>
+            <a:r>
+              <a:rPr lang="fr-FR" sz="1900" dirty="0" smtClean="0"/>
+              <a:t>pour une commande minimum (petite structure):</a:t>
+            </a:r>
+          </a:p>
+          <a:p>
+            <a:pPr marL="457200" lvl="1" indent="0">
+              <a:buNone/>
+            </a:pPr>
+            <a:r>
+              <a:rPr lang="fr-FR" dirty="0" smtClean="0"/>
+              <a:t>150€ * 3 + 50€ * 12 + 35€ * 20 =  1700 €</a:t>
+            </a:r>
+            <a:endParaRPr lang="fr-FR" dirty="0"/>
           </a:p>
         </p:txBody>
       </p:sp>
+      <p:pic>
+        <p:nvPicPr>
+          <p:cNvPr id="4" name="Picture 2" descr="C:\Users\e8k\Documents\GitHub\NightLife\Art\nightsoft 1.png"/>
+          <p:cNvPicPr>
+            <a:picLocks noChangeAspect="1" noChangeArrowheads="1"/>
+          </p:cNvPicPr>
+          <p:nvPr/>
+        </p:nvPicPr>
+        <p:blipFill>
+          <a:blip r:embed="rId2">
+            <a:extLst>
+              <a:ext uri="{28A0092B-C50C-407E-A947-70E740481C1C}">
+                <a14:useLocalDpi xmlns:a14="http://schemas.microsoft.com/office/drawing/2010/main" val="0"/>
+              </a:ext>
+            </a:extLst>
+          </a:blip>
+          <a:srcRect/>
+          <a:stretch>
+            <a:fillRect/>
+          </a:stretch>
+        </p:blipFill>
+        <p:spPr bwMode="auto">
+          <a:xfrm>
+            <a:off x="48356" y="44624"/>
+            <a:ext cx="1673768" cy="1692027"/>
+          </a:xfrm>
+          <a:prstGeom prst="rect">
+            <a:avLst/>
+          </a:prstGeom>
+          <a:noFill/>
+          <a:extLst>
+            <a:ext uri="{909E8E84-426E-40DD-AFC4-6F175D3DCCD1}">
+              <a14:hiddenFill xmlns:a14="http://schemas.microsoft.com/office/drawing/2010/main">
+                <a:solidFill>
+                  <a:srgbClr val="FFFFFF"/>
+                </a:solidFill>
+              </a14:hiddenFill>
+            </a:ext>
+          </a:extLst>
+        </p:spPr>
+      </p:pic>
     </p:spTree>
   </p:cSld>
   <p:clrMapOvr>
@@ -5330,7 +7335,7 @@
       </p:grpSpPr>
       <p:sp>
         <p:nvSpPr>
-          <p:cNvPr id="22530" name="Rectangle 2"/>
+          <p:cNvPr id="26626" name="Rectangle 2"/>
           <p:cNvSpPr>
             <a:spLocks noGrp="1" noChangeArrowheads="1"/>
           </p:cNvSpPr>
@@ -5344,15 +7349,16 @@
           <a:lstStyle/>
           <a:p>
             <a:r>
-              <a:rPr lang="en-US"/>
-              <a:t>Competition</a:t>
-            </a:r>
+              <a:rPr lang="fr-FR" dirty="0" smtClean="0"/>
+              <a:t>Plan de financement</a:t>
+            </a:r>
+            <a:endParaRPr lang="en-US" dirty="0"/>
           </a:p>
         </p:txBody>
       </p:sp>
       <p:sp>
         <p:nvSpPr>
-          <p:cNvPr id="22531" name="Rectangle 3"/>
+          <p:cNvPr id="26627" name="Rectangle 3"/>
           <p:cNvSpPr>
             <a:spLocks noGrp="1" noChangeArrowheads="1"/>
           </p:cNvSpPr>
@@ -5360,24 +7366,69 @@
             <p:ph type="body" idx="1"/>
           </p:nvPr>
         </p:nvSpPr>
-        <p:spPr/>
+        <p:spPr>
+          <a:xfrm>
+            <a:off x="1979712" y="1988840"/>
+            <a:ext cx="6934200" cy="2306960"/>
+          </a:xfrm>
+        </p:spPr>
         <p:txBody>
           <a:bodyPr/>
           <a:lstStyle/>
           <a:p>
             <a:r>
-              <a:rPr lang="en-US"/>
-              <a:t>Summarize the competition.</a:t>
-            </a:r>
-          </a:p>
-          <a:p>
-            <a:r>
-              <a:rPr lang="en-US"/>
-              <a:t>Outline your company’s competitive advantage.</a:t>
-            </a:r>
+              <a:rPr lang="fr-FR" dirty="0"/>
+              <a:t>20 000 € (12,5% bien matériel par associé et 12,5% de liquidité par associé</a:t>
+            </a:r>
+            <a:r>
+              <a:rPr lang="fr-FR" dirty="0" smtClean="0"/>
+              <a:t>)</a:t>
+            </a:r>
+            <a:endParaRPr lang="en-US" dirty="0"/>
           </a:p>
         </p:txBody>
       </p:sp>
+      <p:pic>
+        <p:nvPicPr>
+          <p:cNvPr id="4" name="Picture 2" descr="C:\Users\e8k\Documents\GitHub\NightLife\Art\nightsoft 1.png"/>
+          <p:cNvPicPr>
+            <a:picLocks noChangeAspect="1" noChangeArrowheads="1"/>
+          </p:cNvPicPr>
+          <p:nvPr/>
+        </p:nvPicPr>
+        <p:blipFill>
+          <a:blip r:embed="rId2">
+            <a:extLst>
+              <a:ext uri="{28A0092B-C50C-407E-A947-70E740481C1C}">
+                <a14:useLocalDpi xmlns:a14="http://schemas.microsoft.com/office/drawing/2010/main" val="0"/>
+              </a:ext>
+            </a:extLst>
+          </a:blip>
+          <a:srcRect/>
+          <a:stretch>
+            <a:fillRect/>
+          </a:stretch>
+        </p:blipFill>
+        <p:spPr bwMode="auto">
+          <a:xfrm>
+            <a:off x="48356" y="44624"/>
+            <a:ext cx="1673768" cy="1692027"/>
+          </a:xfrm>
+          <a:prstGeom prst="rect">
+            <a:avLst/>
+          </a:prstGeom>
+          <a:noFill/>
+          <a:extLst>
+            <a:ext uri="{909E8E84-426E-40DD-AFC4-6F175D3DCCD1}">
+              <a14:hiddenFill xmlns:a14="http://schemas.microsoft.com/office/drawing/2010/main">
+                <a:solidFill>
+                  <a:srgbClr val="FFFFFF"/>
+                </a:solidFill>
+              </a14:hiddenFill>
+            </a:ext>
+          </a:extLst>
+        </p:spPr>
+      </p:pic>
     </p:spTree>
   </p:cSld>
   <p:clrMapOvr>
@@ -5412,7 +7463,7 @@
       </p:grpSpPr>
       <p:sp>
         <p:nvSpPr>
-          <p:cNvPr id="23554" name="Rectangle 2"/>
+          <p:cNvPr id="27650" name="Rectangle 2"/>
           <p:cNvSpPr>
             <a:spLocks noGrp="1" noChangeArrowheads="1"/>
           </p:cNvSpPr>
@@ -5427,14 +7478,14 @@
           <a:p>
             <a:r>
               <a:rPr lang="en-US"/>
-              <a:t>Goals and Objectives</a:t>
+              <a:t>Key Issues</a:t>
             </a:r>
           </a:p>
         </p:txBody>
       </p:sp>
       <p:sp>
         <p:nvSpPr>
-          <p:cNvPr id="23555" name="Rectangle 3"/>
+          <p:cNvPr id="27651" name="Rectangle 3"/>
           <p:cNvSpPr>
             <a:spLocks noGrp="1" noChangeArrowheads="1"/>
           </p:cNvSpPr>
@@ -5449,31 +7500,92 @@
           <a:p>
             <a:r>
               <a:rPr lang="en-US"/>
-              <a:t>List five-year goals.</a:t>
-            </a:r>
-          </a:p>
-          <a:p>
+              <a:t>Near term</a:t>
+            </a:r>
+          </a:p>
+          <a:p>
+            <a:pPr lvl="1"/>
             <a:r>
               <a:rPr lang="en-US"/>
-              <a:t>State specific, measurable objectives for achieving your five-year goals.</a:t>
+              <a:t>Identify key decisions and issues that need immediate or near-term resolution.</a:t>
             </a:r>
           </a:p>
           <a:p>
             <a:pPr lvl="1"/>
             <a:r>
               <a:rPr lang="en-US"/>
-              <a:t>List market-share objectives.</a:t>
+              <a:t>State consequences of decision postponement.</a:t>
+            </a:r>
+          </a:p>
+          <a:p>
+            <a:r>
+              <a:rPr lang="en-US"/>
+              <a:t>Long term</a:t>
             </a:r>
           </a:p>
           <a:p>
             <a:pPr lvl="1"/>
             <a:r>
               <a:rPr lang="en-US"/>
-              <a:t>List revenue/profitability objectives.</a:t>
+              <a:t>Identify issues needing long-term resolution.</a:t>
+            </a:r>
+          </a:p>
+          <a:p>
+            <a:pPr lvl="1"/>
+            <a:r>
+              <a:rPr lang="en-US"/>
+              <a:t>State consequences of decision postponement.</a:t>
+            </a:r>
+          </a:p>
+          <a:p>
+            <a:r>
+              <a:rPr lang="en-US"/>
+              <a:t>If you are seeking funding, be specific about any issues that require financial resources for resolution.</a:t>
             </a:r>
           </a:p>
         </p:txBody>
       </p:sp>
+      <p:pic>
+        <p:nvPicPr>
+          <p:cNvPr id="4" name="Picture 2" descr="C:\Users\e8k\Documents\GitHub\NightLife\Art\nightsoft 1.png"/>
+          <p:cNvPicPr>
+            <a:picLocks noChangeAspect="1" noChangeArrowheads="1"/>
+          </p:cNvPicPr>
+          <p:nvPr/>
+        </p:nvPicPr>
+        <p:blipFill>
+          <a:blip r:embed="rId3">
+            <a:extLst>
+              <a:ext uri="{28A0092B-C50C-407E-A947-70E740481C1C}">
+                <a14:useLocalDpi xmlns:a14="http://schemas.microsoft.com/office/drawing/2010/main" val="0"/>
+              </a:ext>
+            </a:extLst>
+          </a:blip>
+          <a:srcRect/>
+          <a:stretch>
+            <a:fillRect/>
+          </a:stretch>
+        </p:blipFill>
+        <p:spPr bwMode="auto">
+          <a:xfrm>
+            <a:off x="48356" y="44624"/>
+            <a:ext cx="1673768" cy="1692027"/>
+          </a:xfrm>
+          <a:prstGeom prst="rect">
+            <a:avLst/>
+          </a:prstGeom>
+          <a:noFill/>
+          <a:extLst>
+            <a:ext uri="{909E8E84-426E-40DD-AFC4-6F175D3DCCD1}">
+              <a14:hiddenFill xmlns:a14="http://schemas.microsoft.com/office/drawing/2010/main">
+                <a:solidFill>
+                  <a:srgbClr val="FFFFFF"/>
+                </a:solidFill>
+              </a14:hiddenFill>
+            </a:ext>
+          </a:extLst>
+        </p:spPr>
+      </p:pic>
     </p:spTree>
   </p:cSld>
   <p:clrMapOvr>
@@ -5492,6 +7604,14 @@
 <file path=ppt/slides/slide9.xml><?xml version="1.0" encoding="utf-8"?>
 <p:sld xmlns:a="http://schemas.openxmlformats.org/drawingml/2006/main" xmlns:r="http://schemas.openxmlformats.org/officeDocument/2006/relationships" xmlns:p="http://schemas.openxmlformats.org/presentationml/2006/main">
   <p:cSld>
+    <p:bg>
+      <p:bgPr>
+        <a:solidFill>
+          <a:schemeClr val="tx1"/>
+        </a:solidFill>
+        <a:effectLst/>
+      </p:bgPr>
+    </p:bg>
     <p:spTree>
       <p:nvGrpSpPr>
         <p:cNvPr id="1" name=""/>
@@ -5506,65 +7626,53 @@
           <a:chExt cx="0" cy="0"/>
         </a:xfrm>
       </p:grpSpPr>
-      <p:sp>
-        <p:nvSpPr>
-          <p:cNvPr id="24578" name="Rectangle 2"/>
-          <p:cNvSpPr>
-            <a:spLocks noGrp="1" noChangeArrowheads="1"/>
-          </p:cNvSpPr>
-          <p:nvPr>
-            <p:ph type="title"/>
-          </p:nvPr>
-        </p:nvSpPr>
-        <p:spPr/>
-        <p:txBody>
-          <a:bodyPr/>
-          <a:lstStyle/>
-          <a:p>
-            <a:r>
-              <a:rPr lang="en-US"/>
-              <a:t>Financial Plan</a:t>
-            </a:r>
-          </a:p>
-        </p:txBody>
-      </p:sp>
-      <p:sp>
-        <p:nvSpPr>
-          <p:cNvPr id="24579" name="Rectangle 3"/>
-          <p:cNvSpPr>
-            <a:spLocks noGrp="1" noChangeArrowheads="1"/>
-          </p:cNvSpPr>
-          <p:nvPr>
-            <p:ph type="body" idx="1"/>
-          </p:nvPr>
-        </p:nvSpPr>
-        <p:spPr/>
-        <p:txBody>
-          <a:bodyPr/>
-          <a:lstStyle/>
-          <a:p>
-            <a:r>
-              <a:rPr lang="en-US"/>
-              <a:t>Outline a high-level financial plan that defines your financial model and pricing assumptions. </a:t>
-            </a:r>
-          </a:p>
-          <a:p>
-            <a:pPr lvl="1"/>
-            <a:r>
-              <a:rPr lang="en-US"/>
-              <a:t>This plan should include expected annual sales and profits for the next three years.</a:t>
-            </a:r>
-          </a:p>
-          <a:p>
-            <a:pPr lvl="1"/>
-            <a:r>
-              <a:rPr lang="en-US"/>
-              <a:t>Use several slides to cover this material appropriately.</a:t>
-            </a:r>
-          </a:p>
-        </p:txBody>
-      </p:sp>
+      <p:pic>
+        <p:nvPicPr>
+          <p:cNvPr id="3074" name="Picture 2" descr="C:\Users\e8k\Documents\GitHub\NightLife\Art\nightsoft 1@2x.png"/>
+          <p:cNvPicPr>
+            <a:picLocks noChangeAspect="1" noChangeArrowheads="1"/>
+          </p:cNvPicPr>
+          <p:nvPr/>
+        </p:nvPicPr>
+        <p:blipFill>
+          <a:blip r:embed="rId2">
+            <a:extLst>
+              <a:ext uri="{28A0092B-C50C-407E-A947-70E740481C1C}">
+                <a14:useLocalDpi xmlns:a14="http://schemas.microsoft.com/office/drawing/2010/main" val="0"/>
+              </a:ext>
+            </a:extLst>
+          </a:blip>
+          <a:srcRect/>
+          <a:stretch>
+            <a:fillRect/>
+          </a:stretch>
+        </p:blipFill>
+        <p:spPr bwMode="auto">
+          <a:xfrm>
+            <a:off x="2123728" y="692696"/>
+            <a:ext cx="5238750" cy="5295900"/>
+          </a:xfrm>
+          <a:prstGeom prst="rect">
+            <a:avLst/>
+          </a:prstGeom>
+          <a:noFill/>
+          <a:extLst>
+            <a:ext uri="{909E8E84-426E-40DD-AFC4-6F175D3DCCD1}">
+              <a14:hiddenFill xmlns:a14="http://schemas.microsoft.com/office/drawing/2010/main">
+                <a:solidFill>
+                  <a:srgbClr val="FFFFFF"/>
+                </a:solidFill>
+              </a14:hiddenFill>
+            </a:ext>
+          </a:extLst>
+        </p:spPr>
+      </p:pic>
     </p:spTree>
+    <p:extLst>
+      <p:ext uri="{BB962C8B-B14F-4D97-AF65-F5344CB8AC3E}">
+        <p14:creationId xmlns:p14="http://schemas.microsoft.com/office/powerpoint/2010/main" val="1591051476"/>
+      </p:ext>
+    </p:extLst>
   </p:cSld>
   <p:clrMapOvr>
     <a:masterClrMapping/>

</xml_diff>